<commit_message>
version finale rapport schéma
</commit_message>
<xml_diff>
--- a/docs/pptx.pptx
+++ b/docs/pptx.pptx
@@ -5,7 +5,7 @@
     <p:sldMasterId id="2147483660" r:id="rId1"/>
   </p:sldMasterIdLst>
   <p:notesMasterIdLst>
-    <p:notesMasterId r:id="rId15"/>
+    <p:notesMasterId r:id="rId16"/>
   </p:notesMasterIdLst>
   <p:sldIdLst>
     <p:sldId id="256" r:id="rId2"/>
@@ -21,6 +21,7 @@
     <p:sldId id="266" r:id="rId12"/>
     <p:sldId id="267" r:id="rId13"/>
     <p:sldId id="268" r:id="rId14"/>
+    <p:sldId id="269" r:id="rId15"/>
   </p:sldIdLst>
   <p:sldSz cx="12192000" cy="6858000"/>
   <p:notesSz cx="6858000" cy="9144000"/>
@@ -209,7 +210,7 @@
           <a:p>
             <a:fld id="{70CE838E-47B7-4E67-941D-FAED8E9B574D}" type="datetimeFigureOut">
               <a:rPr lang="fr-FR" smtClean="0"/>
-              <a:t>04/01/2022</a:t>
+              <a:t>01/04/2022</a:t>
             </a:fld>
             <a:endParaRPr lang="fr-FR"/>
           </a:p>
@@ -689,7 +690,7 @@
           <a:p>
             <a:fld id="{C1111EB8-6897-4D44-8F60-154903CB6F7E}" type="datetime1">
               <a:rPr lang="fr-FR" smtClean="0"/>
-              <a:t>04/01/2022</a:t>
+              <a:t>01/04/2022</a:t>
             </a:fld>
             <a:endParaRPr lang="fr-FR"/>
           </a:p>
@@ -980,7 +981,7 @@
           <a:p>
             <a:fld id="{CB921711-ADA2-4B31-9945-2E98EFACA043}" type="datetime1">
               <a:rPr lang="fr-FR" smtClean="0"/>
-              <a:t>04/01/2022</a:t>
+              <a:t>01/04/2022</a:t>
             </a:fld>
             <a:endParaRPr lang="fr-FR"/>
           </a:p>
@@ -1239,7 +1240,7 @@
           <a:p>
             <a:fld id="{4D61A6BF-7F54-48A9-A939-0CF80AB657B0}" type="datetime1">
               <a:rPr lang="fr-FR" smtClean="0"/>
-              <a:t>04/01/2022</a:t>
+              <a:t>01/04/2022</a:t>
             </a:fld>
             <a:endParaRPr lang="fr-FR"/>
           </a:p>
@@ -1708,7 +1709,7 @@
           <a:p>
             <a:fld id="{D05AF51C-D8EC-434B-AD90-7E40D94AD8BB}" type="datetime1">
               <a:rPr lang="fr-FR" smtClean="0"/>
-              <a:t>04/01/2022</a:t>
+              <a:t>01/04/2022</a:t>
             </a:fld>
             <a:endParaRPr lang="fr-FR"/>
           </a:p>
@@ -1888,7 +1889,7 @@
           <a:p>
             <a:fld id="{30BBD767-C995-47D8-AF8C-BF6D90B2FFAA}" type="datetime1">
               <a:rPr lang="fr-FR" smtClean="0"/>
-              <a:t>04/01/2022</a:t>
+              <a:t>01/04/2022</a:t>
             </a:fld>
             <a:endParaRPr lang="fr-FR"/>
           </a:p>
@@ -2464,7 +2465,7 @@
           <a:p>
             <a:fld id="{5C79812A-6FD7-4DFE-9964-4BB89D846AB4}" type="datetime1">
               <a:rPr lang="fr-FR" smtClean="0"/>
-              <a:t>04/01/2022</a:t>
+              <a:t>01/04/2022</a:t>
             </a:fld>
             <a:endParaRPr lang="fr-FR"/>
           </a:p>
@@ -2796,7 +2797,7 @@
           <a:p>
             <a:fld id="{664A02E9-4552-445C-AEFC-FEF5D353DFDE}" type="datetime1">
               <a:rPr lang="fr-FR" smtClean="0"/>
-              <a:t>04/01/2022</a:t>
+              <a:t>01/04/2022</a:t>
             </a:fld>
             <a:endParaRPr lang="fr-FR"/>
           </a:p>
@@ -2971,7 +2972,7 @@
           <a:p>
             <a:fld id="{11B846EB-5706-4ADA-A71C-8BA04ACC37A1}" type="datetime1">
               <a:rPr lang="fr-FR" smtClean="0"/>
-              <a:t>04/01/2022</a:t>
+              <a:t>01/04/2022</a:t>
             </a:fld>
             <a:endParaRPr lang="fr-FR"/>
           </a:p>
@@ -3151,7 +3152,7 @@
           <a:p>
             <a:fld id="{63887E94-FEC4-43E5-BE7A-25A162621213}" type="datetime1">
               <a:rPr lang="fr-FR" smtClean="0"/>
-              <a:t>04/01/2022</a:t>
+              <a:t>01/04/2022</a:t>
             </a:fld>
             <a:endParaRPr lang="fr-FR"/>
           </a:p>
@@ -3321,7 +3322,7 @@
           <a:p>
             <a:fld id="{0C337C5E-F899-4F82-9FD2-648C7BA3F049}" type="datetime1">
               <a:rPr lang="fr-FR" smtClean="0"/>
-              <a:t>04/01/2022</a:t>
+              <a:t>01/04/2022</a:t>
             </a:fld>
             <a:endParaRPr lang="fr-FR"/>
           </a:p>
@@ -3578,7 +3579,7 @@
           <a:p>
             <a:fld id="{EB91CE8B-46DA-46FE-8D51-C53CBE14C8EA}" type="datetime1">
               <a:rPr lang="fr-FR" smtClean="0"/>
-              <a:t>04/01/2022</a:t>
+              <a:t>01/04/2022</a:t>
             </a:fld>
             <a:endParaRPr lang="fr-FR"/>
           </a:p>
@@ -3870,7 +3871,7 @@
           <a:p>
             <a:fld id="{DEB0D645-FDFD-423F-B95A-30FCE3F34574}" type="datetime1">
               <a:rPr lang="fr-FR" smtClean="0"/>
-              <a:t>04/01/2022</a:t>
+              <a:t>01/04/2022</a:t>
             </a:fld>
             <a:endParaRPr lang="fr-FR"/>
           </a:p>
@@ -4300,7 +4301,7 @@
           <a:p>
             <a:fld id="{9AFF3A1D-1247-4119-9072-2998E03BCA8D}" type="datetime1">
               <a:rPr lang="fr-FR" smtClean="0"/>
-              <a:t>04/01/2022</a:t>
+              <a:t>01/04/2022</a:t>
             </a:fld>
             <a:endParaRPr lang="fr-FR"/>
           </a:p>
@@ -4418,7 +4419,7 @@
           <a:p>
             <a:fld id="{01851008-57C7-4D23-8909-41FC8D805943}" type="datetime1">
               <a:rPr lang="fr-FR" smtClean="0"/>
-              <a:t>04/01/2022</a:t>
+              <a:t>01/04/2022</a:t>
             </a:fld>
             <a:endParaRPr lang="fr-FR"/>
           </a:p>
@@ -4513,7 +4514,7 @@
           <a:p>
             <a:fld id="{33BCF63F-3181-4009-AF94-8906CF189BD0}" type="datetime1">
               <a:rPr lang="fr-FR" smtClean="0"/>
-              <a:t>04/01/2022</a:t>
+              <a:t>01/04/2022</a:t>
             </a:fld>
             <a:endParaRPr lang="fr-FR"/>
           </a:p>
@@ -4796,7 +4797,7 @@
           <a:p>
             <a:fld id="{004EBB41-52C7-4CB3-90CF-8397273E9A11}" type="datetime1">
               <a:rPr lang="fr-FR" smtClean="0"/>
-              <a:t>04/01/2022</a:t>
+              <a:t>01/04/2022</a:t>
             </a:fld>
             <a:endParaRPr lang="fr-FR"/>
           </a:p>
@@ -5087,7 +5088,7 @@
           <a:p>
             <a:fld id="{4A6DC3A6-643A-4432-88D4-7130AC4FADCA}" type="datetime1">
               <a:rPr lang="fr-FR" smtClean="0"/>
-              <a:t>04/01/2022</a:t>
+              <a:t>01/04/2022</a:t>
             </a:fld>
             <a:endParaRPr lang="fr-FR"/>
           </a:p>
@@ -5318,7 +5319,7 @@
           <a:p>
             <a:fld id="{2B55489E-616D-4F97-8948-05C9C7B69106}" type="datetime1">
               <a:rPr lang="fr-FR" smtClean="0"/>
-              <a:t>04/01/2022</a:t>
+              <a:t>01/04/2022</a:t>
             </a:fld>
             <a:endParaRPr lang="fr-FR"/>
           </a:p>
@@ -9533,6 +9534,4330 @@
       <p:bldP spid="39" grpId="0" animBg="1"/>
       <p:bldP spid="40" grpId="0"/>
       <p:bldP spid="42" grpId="0"/>
+    </p:bldLst>
+  </p:timing>
+</p:sld>
+</file>
+
+<file path=ppt/slides/slide14.xml><?xml version="1.0" encoding="utf-8"?>
+<p:sld xmlns:a="http://schemas.openxmlformats.org/drawingml/2006/main" xmlns:r="http://schemas.openxmlformats.org/officeDocument/2006/relationships" xmlns:p="http://schemas.openxmlformats.org/presentationml/2006/main">
+  <p:cSld>
+    <p:spTree>
+      <p:nvGrpSpPr>
+        <p:cNvPr id="1" name=""/>
+        <p:cNvGrpSpPr/>
+        <p:nvPr/>
+      </p:nvGrpSpPr>
+      <p:grpSpPr>
+        <a:xfrm>
+          <a:off x="0" y="0"/>
+          <a:ext cx="0" cy="0"/>
+          <a:chOff x="0" y="0"/>
+          <a:chExt cx="0" cy="0"/>
+        </a:xfrm>
+      </p:grpSpPr>
+      <p:sp>
+        <p:nvSpPr>
+          <p:cNvPr id="158" name="ZoneTexte 157">
+            <a:extLst>
+              <a:ext uri="{FF2B5EF4-FFF2-40B4-BE49-F238E27FC236}">
+                <a16:creationId xmlns:a16="http://schemas.microsoft.com/office/drawing/2014/main" id="{94262B5A-0E0C-4C44-B3B3-F61B8A89B9FA}"/>
+              </a:ext>
+            </a:extLst>
+          </p:cNvPr>
+          <p:cNvSpPr txBox="1"/>
+          <p:nvPr/>
+        </p:nvSpPr>
+        <p:spPr>
+          <a:xfrm>
+            <a:off x="2074352" y="1977104"/>
+            <a:ext cx="2162172" cy="2246769"/>
+          </a:xfrm>
+          <a:prstGeom prst="rect">
+            <a:avLst/>
+          </a:prstGeom>
+          <a:noFill/>
+        </p:spPr>
+        <p:txBody>
+          <a:bodyPr wrap="square" rtlCol="0">
+            <a:spAutoFit/>
+          </a:bodyPr>
+          <a:lstStyle/>
+          <a:p>
+            <a:r>
+              <a:rPr lang="fr-FR" sz="1400" dirty="0"/>
+              <a:t>Enregistrement fichier</a:t>
+            </a:r>
+          </a:p>
+          <a:p>
+            <a:endParaRPr lang="fr-FR" sz="1400" dirty="0"/>
+          </a:p>
+          <a:p>
+            <a:endParaRPr lang="fr-FR" sz="1400" dirty="0"/>
+          </a:p>
+          <a:p>
+            <a:r>
+              <a:rPr lang="fr-FR" sz="1400" dirty="0"/>
+              <a:t>Ouverture fichier</a:t>
+            </a:r>
+          </a:p>
+          <a:p>
+            <a:endParaRPr lang="fr-FR" sz="1400" dirty="0"/>
+          </a:p>
+          <a:p>
+            <a:endParaRPr lang="fr-FR" sz="1400" dirty="0"/>
+          </a:p>
+          <a:p>
+            <a:r>
+              <a:rPr lang="fr-FR" sz="1400" dirty="0"/>
+              <a:t>Lecture fichier</a:t>
+            </a:r>
+          </a:p>
+          <a:p>
+            <a:endParaRPr lang="fr-FR" sz="1400" dirty="0"/>
+          </a:p>
+          <a:p>
+            <a:endParaRPr lang="fr-FR" sz="1400" dirty="0"/>
+          </a:p>
+          <a:p>
+            <a:r>
+              <a:rPr lang="fr-FR" sz="1400" dirty="0"/>
+              <a:t>Recherche fréquence</a:t>
+            </a:r>
+          </a:p>
+        </p:txBody>
+      </p:sp>
+      <p:sp>
+        <p:nvSpPr>
+          <p:cNvPr id="2" name="Rectangle : coins arrondis 1">
+            <a:extLst>
+              <a:ext uri="{FF2B5EF4-FFF2-40B4-BE49-F238E27FC236}">
+                <a16:creationId xmlns:a16="http://schemas.microsoft.com/office/drawing/2014/main" id="{236B6AE0-F7A5-4F8C-A4AE-2D1B96D17F9A}"/>
+              </a:ext>
+            </a:extLst>
+          </p:cNvPr>
+          <p:cNvSpPr/>
+          <p:nvPr/>
+        </p:nvSpPr>
+        <p:spPr>
+          <a:xfrm>
+            <a:off x="5106759" y="97971"/>
+            <a:ext cx="1224643" cy="520331"/>
+          </a:xfrm>
+          <a:prstGeom prst="roundRect">
+            <a:avLst/>
+          </a:prstGeom>
+          <a:noFill/>
+          <a:ln>
+            <a:solidFill>
+              <a:schemeClr val="accent6"/>
+            </a:solidFill>
+          </a:ln>
+        </p:spPr>
+        <p:style>
+          <a:lnRef idx="2">
+            <a:schemeClr val="accent1">
+              <a:shade val="50000"/>
+            </a:schemeClr>
+          </a:lnRef>
+          <a:fillRef idx="1">
+            <a:schemeClr val="accent1"/>
+          </a:fillRef>
+          <a:effectRef idx="0">
+            <a:schemeClr val="accent1"/>
+          </a:effectRef>
+          <a:fontRef idx="minor">
+            <a:schemeClr val="lt1"/>
+          </a:fontRef>
+        </p:style>
+        <p:txBody>
+          <a:bodyPr rtlCol="0" anchor="ctr"/>
+          <a:lstStyle/>
+          <a:p>
+            <a:pPr algn="ctr"/>
+            <a:r>
+              <a:rPr lang="fr-FR" dirty="0"/>
+              <a:t>Index.py</a:t>
+            </a:r>
+          </a:p>
+        </p:txBody>
+      </p:sp>
+      <p:sp>
+        <p:nvSpPr>
+          <p:cNvPr id="48" name="Rectangle : coins arrondis 47">
+            <a:extLst>
+              <a:ext uri="{FF2B5EF4-FFF2-40B4-BE49-F238E27FC236}">
+                <a16:creationId xmlns:a16="http://schemas.microsoft.com/office/drawing/2014/main" id="{45E5D292-FD55-4C1E-9592-9F307710003B}"/>
+              </a:ext>
+            </a:extLst>
+          </p:cNvPr>
+          <p:cNvSpPr/>
+          <p:nvPr/>
+        </p:nvSpPr>
+        <p:spPr>
+          <a:xfrm>
+            <a:off x="197461" y="1420392"/>
+            <a:ext cx="1533525" cy="602797"/>
+          </a:xfrm>
+          <a:prstGeom prst="roundRect">
+            <a:avLst/>
+          </a:prstGeom>
+          <a:noFill/>
+          <a:ln>
+            <a:solidFill>
+              <a:schemeClr val="accent6"/>
+            </a:solidFill>
+          </a:ln>
+        </p:spPr>
+        <p:style>
+          <a:lnRef idx="2">
+            <a:schemeClr val="accent1">
+              <a:shade val="50000"/>
+            </a:schemeClr>
+          </a:lnRef>
+          <a:fillRef idx="1">
+            <a:schemeClr val="accent1"/>
+          </a:fillRef>
+          <a:effectRef idx="0">
+            <a:schemeClr val="accent1"/>
+          </a:effectRef>
+          <a:fontRef idx="minor">
+            <a:schemeClr val="lt1"/>
+          </a:fontRef>
+        </p:style>
+        <p:txBody>
+          <a:bodyPr rtlCol="0" anchor="ctr"/>
+          <a:lstStyle/>
+          <a:p>
+            <a:pPr algn="ctr"/>
+            <a:r>
+              <a:rPr lang="fr-FR" dirty="0"/>
+              <a:t>Accueil.py</a:t>
+            </a:r>
+          </a:p>
+        </p:txBody>
+      </p:sp>
+      <p:sp>
+        <p:nvSpPr>
+          <p:cNvPr id="50" name="Rectangle : coins arrondis 49">
+            <a:extLst>
+              <a:ext uri="{FF2B5EF4-FFF2-40B4-BE49-F238E27FC236}">
+                <a16:creationId xmlns:a16="http://schemas.microsoft.com/office/drawing/2014/main" id="{941AA88C-2DA4-4B58-AEB4-AAB5AF761D73}"/>
+              </a:ext>
+            </a:extLst>
+          </p:cNvPr>
+          <p:cNvSpPr/>
+          <p:nvPr/>
+        </p:nvSpPr>
+        <p:spPr>
+          <a:xfrm>
+            <a:off x="8943290" y="1427267"/>
+            <a:ext cx="2751365" cy="1031421"/>
+          </a:xfrm>
+          <a:prstGeom prst="roundRect">
+            <a:avLst/>
+          </a:prstGeom>
+          <a:noFill/>
+          <a:ln>
+            <a:solidFill>
+              <a:schemeClr val="accent6"/>
+            </a:solidFill>
+          </a:ln>
+        </p:spPr>
+        <p:style>
+          <a:lnRef idx="2">
+            <a:schemeClr val="accent1">
+              <a:shade val="50000"/>
+            </a:schemeClr>
+          </a:lnRef>
+          <a:fillRef idx="1">
+            <a:schemeClr val="accent1"/>
+          </a:fillRef>
+          <a:effectRef idx="0">
+            <a:schemeClr val="accent1"/>
+          </a:effectRef>
+          <a:fontRef idx="minor">
+            <a:schemeClr val="lt1"/>
+          </a:fontRef>
+        </p:style>
+        <p:txBody>
+          <a:bodyPr rtlCol="0" anchor="ctr"/>
+          <a:lstStyle/>
+          <a:p>
+            <a:pPr algn="ctr"/>
+            <a:r>
+              <a:rPr lang="fr-FR" dirty="0"/>
+              <a:t>Parametres.py</a:t>
+            </a:r>
+          </a:p>
+        </p:txBody>
+      </p:sp>
+      <p:sp>
+        <p:nvSpPr>
+          <p:cNvPr id="51" name="Rectangle : coins arrondis 50">
+            <a:extLst>
+              <a:ext uri="{FF2B5EF4-FFF2-40B4-BE49-F238E27FC236}">
+                <a16:creationId xmlns:a16="http://schemas.microsoft.com/office/drawing/2014/main" id="{ECE4DDCB-8F81-40F8-8600-9D6D32BE8836}"/>
+              </a:ext>
+            </a:extLst>
+          </p:cNvPr>
+          <p:cNvSpPr/>
+          <p:nvPr/>
+        </p:nvSpPr>
+        <p:spPr>
+          <a:xfrm>
+            <a:off x="4306462" y="1416439"/>
+            <a:ext cx="4439266" cy="3258299"/>
+          </a:xfrm>
+          <a:prstGeom prst="roundRect">
+            <a:avLst/>
+          </a:prstGeom>
+          <a:noFill/>
+          <a:ln>
+            <a:solidFill>
+              <a:schemeClr val="accent6"/>
+            </a:solidFill>
+          </a:ln>
+        </p:spPr>
+        <p:style>
+          <a:lnRef idx="2">
+            <a:schemeClr val="accent1">
+              <a:shade val="50000"/>
+            </a:schemeClr>
+          </a:lnRef>
+          <a:fillRef idx="1">
+            <a:schemeClr val="accent1"/>
+          </a:fillRef>
+          <a:effectRef idx="0">
+            <a:schemeClr val="accent1"/>
+          </a:effectRef>
+          <a:fontRef idx="minor">
+            <a:schemeClr val="lt1"/>
+          </a:fontRef>
+        </p:style>
+        <p:txBody>
+          <a:bodyPr rtlCol="0" anchor="ctr"/>
+          <a:lstStyle/>
+          <a:p>
+            <a:pPr algn="ctr"/>
+            <a:endParaRPr lang="fr-FR" dirty="0"/>
+          </a:p>
+        </p:txBody>
+      </p:sp>
+      <p:sp>
+        <p:nvSpPr>
+          <p:cNvPr id="56" name="Rectangle : coins arrondis 55">
+            <a:extLst>
+              <a:ext uri="{FF2B5EF4-FFF2-40B4-BE49-F238E27FC236}">
+                <a16:creationId xmlns:a16="http://schemas.microsoft.com/office/drawing/2014/main" id="{FA2D3923-CFE5-4601-A043-2C63BF488875}"/>
+              </a:ext>
+            </a:extLst>
+          </p:cNvPr>
+          <p:cNvSpPr/>
+          <p:nvPr/>
+        </p:nvSpPr>
+        <p:spPr>
+          <a:xfrm>
+            <a:off x="1888608" y="1416439"/>
+            <a:ext cx="2254465" cy="3196382"/>
+          </a:xfrm>
+          <a:prstGeom prst="roundRect">
+            <a:avLst/>
+          </a:prstGeom>
+          <a:noFill/>
+          <a:ln>
+            <a:solidFill>
+              <a:schemeClr val="accent6"/>
+            </a:solidFill>
+          </a:ln>
+        </p:spPr>
+        <p:style>
+          <a:lnRef idx="2">
+            <a:schemeClr val="accent1">
+              <a:shade val="50000"/>
+            </a:schemeClr>
+          </a:lnRef>
+          <a:fillRef idx="1">
+            <a:schemeClr val="accent1"/>
+          </a:fillRef>
+          <a:effectRef idx="0">
+            <a:schemeClr val="accent1"/>
+          </a:effectRef>
+          <a:fontRef idx="minor">
+            <a:schemeClr val="lt1"/>
+          </a:fontRef>
+        </p:style>
+        <p:txBody>
+          <a:bodyPr rtlCol="0" anchor="ctr"/>
+          <a:lstStyle/>
+          <a:p>
+            <a:pPr algn="ctr"/>
+            <a:endParaRPr lang="fr-FR" dirty="0"/>
+          </a:p>
+        </p:txBody>
+      </p:sp>
+      <p:sp>
+        <p:nvSpPr>
+          <p:cNvPr id="57" name="Rectangle : coins arrondis 56">
+            <a:extLst>
+              <a:ext uri="{FF2B5EF4-FFF2-40B4-BE49-F238E27FC236}">
+                <a16:creationId xmlns:a16="http://schemas.microsoft.com/office/drawing/2014/main" id="{C8B751C9-C089-4660-97FC-D6B70A0C9D2E}"/>
+              </a:ext>
+            </a:extLst>
+          </p:cNvPr>
+          <p:cNvSpPr/>
+          <p:nvPr/>
+        </p:nvSpPr>
+        <p:spPr>
+          <a:xfrm>
+            <a:off x="7725436" y="5667222"/>
+            <a:ext cx="2239736" cy="1031421"/>
+          </a:xfrm>
+          <a:prstGeom prst="roundRect">
+            <a:avLst/>
+          </a:prstGeom>
+          <a:noFill/>
+          <a:ln>
+            <a:solidFill>
+              <a:schemeClr val="accent6"/>
+            </a:solidFill>
+          </a:ln>
+        </p:spPr>
+        <p:style>
+          <a:lnRef idx="2">
+            <a:schemeClr val="accent1">
+              <a:shade val="50000"/>
+            </a:schemeClr>
+          </a:lnRef>
+          <a:fillRef idx="1">
+            <a:schemeClr val="accent1"/>
+          </a:fillRef>
+          <a:effectRef idx="0">
+            <a:schemeClr val="accent1"/>
+          </a:effectRef>
+          <a:fontRef idx="minor">
+            <a:schemeClr val="lt1"/>
+          </a:fontRef>
+        </p:style>
+        <p:txBody>
+          <a:bodyPr rtlCol="0" anchor="ctr"/>
+          <a:lstStyle/>
+          <a:p>
+            <a:pPr algn="ctr"/>
+            <a:r>
+              <a:rPr lang="fr-FR" dirty="0"/>
+              <a:t>Chrono.py</a:t>
+            </a:r>
+          </a:p>
+        </p:txBody>
+      </p:sp>
+      <p:sp>
+        <p:nvSpPr>
+          <p:cNvPr id="58" name="Rectangle : coins arrondis 57">
+            <a:extLst>
+              <a:ext uri="{FF2B5EF4-FFF2-40B4-BE49-F238E27FC236}">
+                <a16:creationId xmlns:a16="http://schemas.microsoft.com/office/drawing/2014/main" id="{910EB297-6742-41E0-BC0E-1FB5DA6365F3}"/>
+              </a:ext>
+            </a:extLst>
+          </p:cNvPr>
+          <p:cNvSpPr/>
+          <p:nvPr/>
+        </p:nvSpPr>
+        <p:spPr>
+          <a:xfrm>
+            <a:off x="3642316" y="5680404"/>
+            <a:ext cx="2239736" cy="1031421"/>
+          </a:xfrm>
+          <a:prstGeom prst="roundRect">
+            <a:avLst/>
+          </a:prstGeom>
+          <a:noFill/>
+          <a:ln>
+            <a:solidFill>
+              <a:schemeClr val="accent6"/>
+            </a:solidFill>
+          </a:ln>
+        </p:spPr>
+        <p:style>
+          <a:lnRef idx="2">
+            <a:schemeClr val="accent1">
+              <a:shade val="50000"/>
+            </a:schemeClr>
+          </a:lnRef>
+          <a:fillRef idx="1">
+            <a:schemeClr val="accent1"/>
+          </a:fillRef>
+          <a:effectRef idx="0">
+            <a:schemeClr val="accent1"/>
+          </a:effectRef>
+          <a:fontRef idx="minor">
+            <a:schemeClr val="lt1"/>
+          </a:fontRef>
+        </p:style>
+        <p:txBody>
+          <a:bodyPr rtlCol="0" anchor="ctr"/>
+          <a:lstStyle/>
+          <a:p>
+            <a:pPr algn="ctr"/>
+            <a:r>
+              <a:rPr lang="fr-FR" dirty="0"/>
+              <a:t>Back.py</a:t>
+            </a:r>
+          </a:p>
+          <a:p>
+            <a:pPr algn="ctr"/>
+            <a:endParaRPr lang="fr-FR" dirty="0"/>
+          </a:p>
+          <a:p>
+            <a:pPr algn="ctr"/>
+            <a:endParaRPr lang="fr-FR" dirty="0"/>
+          </a:p>
+        </p:txBody>
+      </p:sp>
+      <p:cxnSp>
+        <p:nvCxnSpPr>
+          <p:cNvPr id="6" name="Connecteur droit 5">
+            <a:extLst>
+              <a:ext uri="{FF2B5EF4-FFF2-40B4-BE49-F238E27FC236}">
+                <a16:creationId xmlns:a16="http://schemas.microsoft.com/office/drawing/2014/main" id="{C5B49FCC-A8F6-4350-BB8A-4094F9166235}"/>
+              </a:ext>
+            </a:extLst>
+          </p:cNvPr>
+          <p:cNvCxnSpPr>
+            <a:cxnSpLocks/>
+            <a:stCxn id="48" idx="0"/>
+            <a:endCxn id="2" idx="2"/>
+          </p:cNvCxnSpPr>
+          <p:nvPr/>
+        </p:nvCxnSpPr>
+        <p:spPr>
+          <a:xfrm flipV="1">
+            <a:off x="964224" y="618302"/>
+            <a:ext cx="4754857" cy="802090"/>
+          </a:xfrm>
+          <a:prstGeom prst="line">
+            <a:avLst/>
+          </a:prstGeom>
+          <a:ln w="19050">
+            <a:solidFill>
+              <a:schemeClr val="accent6"/>
+            </a:solidFill>
+          </a:ln>
+        </p:spPr>
+        <p:style>
+          <a:lnRef idx="1">
+            <a:schemeClr val="accent1"/>
+          </a:lnRef>
+          <a:fillRef idx="0">
+            <a:schemeClr val="accent1"/>
+          </a:fillRef>
+          <a:effectRef idx="0">
+            <a:schemeClr val="accent1"/>
+          </a:effectRef>
+          <a:fontRef idx="minor">
+            <a:schemeClr val="tx1"/>
+          </a:fontRef>
+        </p:style>
+      </p:cxnSp>
+      <p:cxnSp>
+        <p:nvCxnSpPr>
+          <p:cNvPr id="59" name="Connecteur droit 58">
+            <a:extLst>
+              <a:ext uri="{FF2B5EF4-FFF2-40B4-BE49-F238E27FC236}">
+                <a16:creationId xmlns:a16="http://schemas.microsoft.com/office/drawing/2014/main" id="{1978AEDB-8A2E-4A9A-8FF4-59B60D917E9D}"/>
+              </a:ext>
+            </a:extLst>
+          </p:cNvPr>
+          <p:cNvCxnSpPr>
+            <a:cxnSpLocks/>
+            <a:stCxn id="56" idx="0"/>
+            <a:endCxn id="2" idx="2"/>
+          </p:cNvCxnSpPr>
+          <p:nvPr/>
+        </p:nvCxnSpPr>
+        <p:spPr>
+          <a:xfrm flipV="1">
+            <a:off x="3015841" y="618302"/>
+            <a:ext cx="2703240" cy="798137"/>
+          </a:xfrm>
+          <a:prstGeom prst="line">
+            <a:avLst/>
+          </a:prstGeom>
+          <a:ln w="19050">
+            <a:solidFill>
+              <a:schemeClr val="accent6"/>
+            </a:solidFill>
+          </a:ln>
+        </p:spPr>
+        <p:style>
+          <a:lnRef idx="1">
+            <a:schemeClr val="accent1"/>
+          </a:lnRef>
+          <a:fillRef idx="0">
+            <a:schemeClr val="accent1"/>
+          </a:fillRef>
+          <a:effectRef idx="0">
+            <a:schemeClr val="accent1"/>
+          </a:effectRef>
+          <a:fontRef idx="minor">
+            <a:schemeClr val="tx1"/>
+          </a:fontRef>
+        </p:style>
+      </p:cxnSp>
+      <p:cxnSp>
+        <p:nvCxnSpPr>
+          <p:cNvPr id="60" name="Connecteur droit 59">
+            <a:extLst>
+              <a:ext uri="{FF2B5EF4-FFF2-40B4-BE49-F238E27FC236}">
+                <a16:creationId xmlns:a16="http://schemas.microsoft.com/office/drawing/2014/main" id="{05A25089-83C2-4ED7-909B-545B83304653}"/>
+              </a:ext>
+            </a:extLst>
+          </p:cNvPr>
+          <p:cNvCxnSpPr>
+            <a:cxnSpLocks/>
+            <a:stCxn id="51" idx="0"/>
+            <a:endCxn id="2" idx="2"/>
+          </p:cNvCxnSpPr>
+          <p:nvPr/>
+        </p:nvCxnSpPr>
+        <p:spPr>
+          <a:xfrm flipH="1" flipV="1">
+            <a:off x="5719081" y="618302"/>
+            <a:ext cx="807014" cy="798137"/>
+          </a:xfrm>
+          <a:prstGeom prst="line">
+            <a:avLst/>
+          </a:prstGeom>
+          <a:ln w="19050">
+            <a:solidFill>
+              <a:schemeClr val="accent6"/>
+            </a:solidFill>
+          </a:ln>
+        </p:spPr>
+        <p:style>
+          <a:lnRef idx="1">
+            <a:schemeClr val="accent1"/>
+          </a:lnRef>
+          <a:fillRef idx="0">
+            <a:schemeClr val="accent1"/>
+          </a:fillRef>
+          <a:effectRef idx="0">
+            <a:schemeClr val="accent1"/>
+          </a:effectRef>
+          <a:fontRef idx="minor">
+            <a:schemeClr val="tx1"/>
+          </a:fontRef>
+        </p:style>
+      </p:cxnSp>
+      <p:cxnSp>
+        <p:nvCxnSpPr>
+          <p:cNvPr id="61" name="Connecteur droit 60">
+            <a:extLst>
+              <a:ext uri="{FF2B5EF4-FFF2-40B4-BE49-F238E27FC236}">
+                <a16:creationId xmlns:a16="http://schemas.microsoft.com/office/drawing/2014/main" id="{02621138-14E6-4052-ABA2-59BEB525EE13}"/>
+              </a:ext>
+            </a:extLst>
+          </p:cNvPr>
+          <p:cNvCxnSpPr>
+            <a:cxnSpLocks/>
+            <a:stCxn id="50" idx="0"/>
+            <a:endCxn id="2" idx="2"/>
+          </p:cNvCxnSpPr>
+          <p:nvPr/>
+        </p:nvCxnSpPr>
+        <p:spPr>
+          <a:xfrm flipH="1" flipV="1">
+            <a:off x="5719081" y="618302"/>
+            <a:ext cx="4599892" cy="808965"/>
+          </a:xfrm>
+          <a:prstGeom prst="line">
+            <a:avLst/>
+          </a:prstGeom>
+          <a:ln w="19050">
+            <a:solidFill>
+              <a:schemeClr val="accent6"/>
+            </a:solidFill>
+          </a:ln>
+        </p:spPr>
+        <p:style>
+          <a:lnRef idx="1">
+            <a:schemeClr val="accent1"/>
+          </a:lnRef>
+          <a:fillRef idx="0">
+            <a:schemeClr val="accent1"/>
+          </a:fillRef>
+          <a:effectRef idx="0">
+            <a:schemeClr val="accent1"/>
+          </a:effectRef>
+          <a:fontRef idx="minor">
+            <a:schemeClr val="tx1"/>
+          </a:fontRef>
+        </p:style>
+      </p:cxnSp>
+      <p:cxnSp>
+        <p:nvCxnSpPr>
+          <p:cNvPr id="62" name="Connecteur droit 61">
+            <a:extLst>
+              <a:ext uri="{FF2B5EF4-FFF2-40B4-BE49-F238E27FC236}">
+                <a16:creationId xmlns:a16="http://schemas.microsoft.com/office/drawing/2014/main" id="{633FCC82-ECAB-406E-866A-AD5B7D623B62}"/>
+              </a:ext>
+            </a:extLst>
+          </p:cNvPr>
+          <p:cNvCxnSpPr>
+            <a:cxnSpLocks/>
+            <a:stCxn id="57" idx="0"/>
+            <a:endCxn id="51" idx="2"/>
+          </p:cNvCxnSpPr>
+          <p:nvPr/>
+        </p:nvCxnSpPr>
+        <p:spPr>
+          <a:xfrm flipH="1" flipV="1">
+            <a:off x="6526095" y="4674738"/>
+            <a:ext cx="2319209" cy="992484"/>
+          </a:xfrm>
+          <a:prstGeom prst="line">
+            <a:avLst/>
+          </a:prstGeom>
+          <a:ln w="19050">
+            <a:solidFill>
+              <a:schemeClr val="accent6"/>
+            </a:solidFill>
+          </a:ln>
+        </p:spPr>
+        <p:style>
+          <a:lnRef idx="1">
+            <a:schemeClr val="accent1"/>
+          </a:lnRef>
+          <a:fillRef idx="0">
+            <a:schemeClr val="accent1"/>
+          </a:fillRef>
+          <a:effectRef idx="0">
+            <a:schemeClr val="accent1"/>
+          </a:effectRef>
+          <a:fontRef idx="minor">
+            <a:schemeClr val="tx1"/>
+          </a:fontRef>
+        </p:style>
+      </p:cxnSp>
+      <p:cxnSp>
+        <p:nvCxnSpPr>
+          <p:cNvPr id="63" name="Connecteur droit 62">
+            <a:extLst>
+              <a:ext uri="{FF2B5EF4-FFF2-40B4-BE49-F238E27FC236}">
+                <a16:creationId xmlns:a16="http://schemas.microsoft.com/office/drawing/2014/main" id="{55873A75-DF03-435B-AAC9-A4DB1A81B812}"/>
+              </a:ext>
+            </a:extLst>
+          </p:cNvPr>
+          <p:cNvCxnSpPr>
+            <a:cxnSpLocks/>
+            <a:stCxn id="58" idx="0"/>
+            <a:endCxn id="51" idx="2"/>
+          </p:cNvCxnSpPr>
+          <p:nvPr/>
+        </p:nvCxnSpPr>
+        <p:spPr>
+          <a:xfrm flipV="1">
+            <a:off x="4762184" y="4674738"/>
+            <a:ext cx="1763911" cy="1005666"/>
+          </a:xfrm>
+          <a:prstGeom prst="line">
+            <a:avLst/>
+          </a:prstGeom>
+          <a:ln w="19050">
+            <a:solidFill>
+              <a:schemeClr val="accent6"/>
+            </a:solidFill>
+          </a:ln>
+        </p:spPr>
+        <p:style>
+          <a:lnRef idx="1">
+            <a:schemeClr val="accent1"/>
+          </a:lnRef>
+          <a:fillRef idx="0">
+            <a:schemeClr val="accent1"/>
+          </a:fillRef>
+          <a:effectRef idx="0">
+            <a:schemeClr val="accent1"/>
+          </a:effectRef>
+          <a:fontRef idx="minor">
+            <a:schemeClr val="tx1"/>
+          </a:fontRef>
+        </p:style>
+      </p:cxnSp>
+      <p:cxnSp>
+        <p:nvCxnSpPr>
+          <p:cNvPr id="64" name="Connecteur droit 63">
+            <a:extLst>
+              <a:ext uri="{FF2B5EF4-FFF2-40B4-BE49-F238E27FC236}">
+                <a16:creationId xmlns:a16="http://schemas.microsoft.com/office/drawing/2014/main" id="{D7E4FE04-38EE-4849-9F21-25BBCB764B68}"/>
+              </a:ext>
+            </a:extLst>
+          </p:cNvPr>
+          <p:cNvCxnSpPr>
+            <a:cxnSpLocks/>
+            <a:stCxn id="58" idx="0"/>
+            <a:endCxn id="56" idx="2"/>
+          </p:cNvCxnSpPr>
+          <p:nvPr/>
+        </p:nvCxnSpPr>
+        <p:spPr>
+          <a:xfrm flipH="1" flipV="1">
+            <a:off x="3015841" y="4612821"/>
+            <a:ext cx="1746343" cy="1067583"/>
+          </a:xfrm>
+          <a:prstGeom prst="line">
+            <a:avLst/>
+          </a:prstGeom>
+          <a:ln w="19050">
+            <a:solidFill>
+              <a:schemeClr val="accent6"/>
+            </a:solidFill>
+          </a:ln>
+        </p:spPr>
+        <p:style>
+          <a:lnRef idx="1">
+            <a:schemeClr val="accent1"/>
+          </a:lnRef>
+          <a:fillRef idx="0">
+            <a:schemeClr val="accent1"/>
+          </a:fillRef>
+          <a:effectRef idx="0">
+            <a:schemeClr val="accent1"/>
+          </a:effectRef>
+          <a:fontRef idx="minor">
+            <a:schemeClr val="tx1"/>
+          </a:fontRef>
+        </p:style>
+      </p:cxnSp>
+      <p:sp>
+        <p:nvSpPr>
+          <p:cNvPr id="69" name="ZoneTexte 68">
+            <a:extLst>
+              <a:ext uri="{FF2B5EF4-FFF2-40B4-BE49-F238E27FC236}">
+                <a16:creationId xmlns:a16="http://schemas.microsoft.com/office/drawing/2014/main" id="{83FDA641-B255-419F-AE81-BE412846E0FB}"/>
+              </a:ext>
+            </a:extLst>
+          </p:cNvPr>
+          <p:cNvSpPr txBox="1"/>
+          <p:nvPr/>
+        </p:nvSpPr>
+        <p:spPr>
+          <a:xfrm>
+            <a:off x="5106759" y="30041"/>
+            <a:ext cx="907596" cy="276999"/>
+          </a:xfrm>
+          <a:prstGeom prst="rect">
+            <a:avLst/>
+          </a:prstGeom>
+          <a:noFill/>
+        </p:spPr>
+        <p:txBody>
+          <a:bodyPr wrap="square" rtlCol="0">
+            <a:spAutoFit/>
+          </a:bodyPr>
+          <a:lstStyle/>
+          <a:p>
+            <a:r>
+              <a:rPr lang="fr-FR" sz="1200" dirty="0">
+                <a:solidFill>
+                  <a:srgbClr val="00B050"/>
+                </a:solidFill>
+              </a:rPr>
+              <a:t>Tkinter</a:t>
+            </a:r>
+            <a:endParaRPr lang="fr-FR" dirty="0">
+              <a:solidFill>
+                <a:srgbClr val="00B050"/>
+              </a:solidFill>
+            </a:endParaRPr>
+          </a:p>
+        </p:txBody>
+      </p:sp>
+      <p:sp>
+        <p:nvSpPr>
+          <p:cNvPr id="70" name="ZoneTexte 69">
+            <a:extLst>
+              <a:ext uri="{FF2B5EF4-FFF2-40B4-BE49-F238E27FC236}">
+                <a16:creationId xmlns:a16="http://schemas.microsoft.com/office/drawing/2014/main" id="{443BA1AC-99D0-420E-82B0-71E94C62500A}"/>
+              </a:ext>
+            </a:extLst>
+          </p:cNvPr>
+          <p:cNvSpPr txBox="1"/>
+          <p:nvPr/>
+        </p:nvSpPr>
+        <p:spPr>
+          <a:xfrm>
+            <a:off x="2247841" y="2299441"/>
+            <a:ext cx="907596" cy="276999"/>
+          </a:xfrm>
+          <a:prstGeom prst="rect">
+            <a:avLst/>
+          </a:prstGeom>
+          <a:noFill/>
+        </p:spPr>
+        <p:txBody>
+          <a:bodyPr wrap="square" rtlCol="0">
+            <a:spAutoFit/>
+          </a:bodyPr>
+          <a:lstStyle/>
+          <a:p>
+            <a:r>
+              <a:rPr lang="fr-FR" sz="1200" dirty="0">
+                <a:solidFill>
+                  <a:srgbClr val="00B050"/>
+                </a:solidFill>
+              </a:rPr>
+              <a:t>PyAudio</a:t>
+            </a:r>
+            <a:endParaRPr lang="fr-FR" dirty="0">
+              <a:solidFill>
+                <a:srgbClr val="00B050"/>
+              </a:solidFill>
+            </a:endParaRPr>
+          </a:p>
+        </p:txBody>
+      </p:sp>
+      <p:sp>
+        <p:nvSpPr>
+          <p:cNvPr id="71" name="ZoneTexte 70">
+            <a:extLst>
+              <a:ext uri="{FF2B5EF4-FFF2-40B4-BE49-F238E27FC236}">
+                <a16:creationId xmlns:a16="http://schemas.microsoft.com/office/drawing/2014/main" id="{2AE12682-ECCA-42B3-9A1C-730367DA740D}"/>
+              </a:ext>
+            </a:extLst>
+          </p:cNvPr>
+          <p:cNvSpPr txBox="1"/>
+          <p:nvPr/>
+        </p:nvSpPr>
+        <p:spPr>
+          <a:xfrm>
+            <a:off x="4664331" y="1366920"/>
+            <a:ext cx="907596" cy="276999"/>
+          </a:xfrm>
+          <a:prstGeom prst="rect">
+            <a:avLst/>
+          </a:prstGeom>
+          <a:noFill/>
+        </p:spPr>
+        <p:txBody>
+          <a:bodyPr wrap="square" rtlCol="0">
+            <a:spAutoFit/>
+          </a:bodyPr>
+          <a:lstStyle/>
+          <a:p>
+            <a:r>
+              <a:rPr lang="fr-FR" sz="1200" dirty="0">
+                <a:solidFill>
+                  <a:srgbClr val="00B050"/>
+                </a:solidFill>
+              </a:rPr>
+              <a:t>Tkinter</a:t>
+            </a:r>
+            <a:endParaRPr lang="fr-FR" dirty="0">
+              <a:solidFill>
+                <a:srgbClr val="00B050"/>
+              </a:solidFill>
+            </a:endParaRPr>
+          </a:p>
+        </p:txBody>
+      </p:sp>
+      <p:sp>
+        <p:nvSpPr>
+          <p:cNvPr id="72" name="ZoneTexte 71">
+            <a:extLst>
+              <a:ext uri="{FF2B5EF4-FFF2-40B4-BE49-F238E27FC236}">
+                <a16:creationId xmlns:a16="http://schemas.microsoft.com/office/drawing/2014/main" id="{1B58DBF4-FBC0-45A3-85A7-0F8305E6D752}"/>
+              </a:ext>
+            </a:extLst>
+          </p:cNvPr>
+          <p:cNvSpPr txBox="1"/>
+          <p:nvPr/>
+        </p:nvSpPr>
+        <p:spPr>
+          <a:xfrm>
+            <a:off x="2111772" y="1359875"/>
+            <a:ext cx="907596" cy="276999"/>
+          </a:xfrm>
+          <a:prstGeom prst="rect">
+            <a:avLst/>
+          </a:prstGeom>
+          <a:noFill/>
+        </p:spPr>
+        <p:txBody>
+          <a:bodyPr wrap="square" rtlCol="0">
+            <a:spAutoFit/>
+          </a:bodyPr>
+          <a:lstStyle/>
+          <a:p>
+            <a:r>
+              <a:rPr lang="fr-FR" sz="1200" dirty="0">
+                <a:solidFill>
+                  <a:srgbClr val="00B050"/>
+                </a:solidFill>
+              </a:rPr>
+              <a:t>Tkinter</a:t>
+            </a:r>
+            <a:endParaRPr lang="fr-FR" dirty="0">
+              <a:solidFill>
+                <a:srgbClr val="00B050"/>
+              </a:solidFill>
+            </a:endParaRPr>
+          </a:p>
+        </p:txBody>
+      </p:sp>
+      <p:sp>
+        <p:nvSpPr>
+          <p:cNvPr id="73" name="ZoneTexte 72">
+            <a:extLst>
+              <a:ext uri="{FF2B5EF4-FFF2-40B4-BE49-F238E27FC236}">
+                <a16:creationId xmlns:a16="http://schemas.microsoft.com/office/drawing/2014/main" id="{27C75777-D3DE-40F9-A5A3-4F60D2CDEC6D}"/>
+              </a:ext>
+            </a:extLst>
+          </p:cNvPr>
+          <p:cNvSpPr txBox="1"/>
+          <p:nvPr/>
+        </p:nvSpPr>
+        <p:spPr>
+          <a:xfrm>
+            <a:off x="7818640" y="5647832"/>
+            <a:ext cx="907596" cy="276999"/>
+          </a:xfrm>
+          <a:prstGeom prst="rect">
+            <a:avLst/>
+          </a:prstGeom>
+          <a:noFill/>
+        </p:spPr>
+        <p:txBody>
+          <a:bodyPr wrap="square" rtlCol="0">
+            <a:spAutoFit/>
+          </a:bodyPr>
+          <a:lstStyle/>
+          <a:p>
+            <a:r>
+              <a:rPr lang="fr-FR" sz="1200" dirty="0">
+                <a:solidFill>
+                  <a:srgbClr val="00B050"/>
+                </a:solidFill>
+              </a:rPr>
+              <a:t>Tkinter</a:t>
+            </a:r>
+            <a:endParaRPr lang="fr-FR" dirty="0">
+              <a:solidFill>
+                <a:srgbClr val="00B050"/>
+              </a:solidFill>
+            </a:endParaRPr>
+          </a:p>
+        </p:txBody>
+      </p:sp>
+      <p:sp>
+        <p:nvSpPr>
+          <p:cNvPr id="74" name="ZoneTexte 73">
+            <a:extLst>
+              <a:ext uri="{FF2B5EF4-FFF2-40B4-BE49-F238E27FC236}">
+                <a16:creationId xmlns:a16="http://schemas.microsoft.com/office/drawing/2014/main" id="{DCC5B64C-73BE-4B4A-97CE-A4AAEE550238}"/>
+              </a:ext>
+            </a:extLst>
+          </p:cNvPr>
+          <p:cNvSpPr txBox="1"/>
+          <p:nvPr/>
+        </p:nvSpPr>
+        <p:spPr>
+          <a:xfrm>
+            <a:off x="173998" y="1366919"/>
+            <a:ext cx="907596" cy="276999"/>
+          </a:xfrm>
+          <a:prstGeom prst="rect">
+            <a:avLst/>
+          </a:prstGeom>
+          <a:noFill/>
+        </p:spPr>
+        <p:txBody>
+          <a:bodyPr wrap="square" rtlCol="0">
+            <a:spAutoFit/>
+          </a:bodyPr>
+          <a:lstStyle/>
+          <a:p>
+            <a:r>
+              <a:rPr lang="fr-FR" sz="1200" dirty="0">
+                <a:solidFill>
+                  <a:srgbClr val="00B050"/>
+                </a:solidFill>
+              </a:rPr>
+              <a:t>Tkinter</a:t>
+            </a:r>
+            <a:endParaRPr lang="fr-FR" dirty="0">
+              <a:solidFill>
+                <a:srgbClr val="00B050"/>
+              </a:solidFill>
+            </a:endParaRPr>
+          </a:p>
+        </p:txBody>
+      </p:sp>
+      <p:sp>
+        <p:nvSpPr>
+          <p:cNvPr id="78" name="ZoneTexte 77">
+            <a:extLst>
+              <a:ext uri="{FF2B5EF4-FFF2-40B4-BE49-F238E27FC236}">
+                <a16:creationId xmlns:a16="http://schemas.microsoft.com/office/drawing/2014/main" id="{7D05DAC2-384B-4829-926A-FB5FCC32C497}"/>
+              </a:ext>
+            </a:extLst>
+          </p:cNvPr>
+          <p:cNvSpPr txBox="1"/>
+          <p:nvPr/>
+        </p:nvSpPr>
+        <p:spPr>
+          <a:xfrm>
+            <a:off x="2088136" y="1488322"/>
+            <a:ext cx="1857375" cy="369332"/>
+          </a:xfrm>
+          <a:prstGeom prst="rect">
+            <a:avLst/>
+          </a:prstGeom>
+          <a:noFill/>
+        </p:spPr>
+        <p:txBody>
+          <a:bodyPr wrap="square" rtlCol="0">
+            <a:spAutoFit/>
+          </a:bodyPr>
+          <a:lstStyle/>
+          <a:p>
+            <a:pPr algn="ctr"/>
+            <a:r>
+              <a:rPr lang="fr-FR" dirty="0"/>
+              <a:t>Accordeur.py</a:t>
+            </a:r>
+          </a:p>
+        </p:txBody>
+      </p:sp>
+      <p:cxnSp>
+        <p:nvCxnSpPr>
+          <p:cNvPr id="186" name="Connecteur droit avec flèche 185">
+            <a:extLst>
+              <a:ext uri="{FF2B5EF4-FFF2-40B4-BE49-F238E27FC236}">
+                <a16:creationId xmlns:a16="http://schemas.microsoft.com/office/drawing/2014/main" id="{3B37D69B-4D9E-4485-98F4-85D7BB82377C}"/>
+              </a:ext>
+            </a:extLst>
+          </p:cNvPr>
+          <p:cNvCxnSpPr>
+            <a:cxnSpLocks/>
+          </p:cNvCxnSpPr>
+          <p:nvPr/>
+        </p:nvCxnSpPr>
+        <p:spPr>
+          <a:xfrm>
+            <a:off x="2226750" y="2261507"/>
+            <a:ext cx="0" cy="352869"/>
+          </a:xfrm>
+          <a:prstGeom prst="straightConnector1">
+            <a:avLst/>
+          </a:prstGeom>
+          <a:ln>
+            <a:tailEnd type="triangle"/>
+          </a:ln>
+        </p:spPr>
+        <p:style>
+          <a:lnRef idx="3">
+            <a:schemeClr val="accent6"/>
+          </a:lnRef>
+          <a:fillRef idx="0">
+            <a:schemeClr val="accent6"/>
+          </a:fillRef>
+          <a:effectRef idx="2">
+            <a:schemeClr val="accent6"/>
+          </a:effectRef>
+          <a:fontRef idx="minor">
+            <a:schemeClr val="tx1"/>
+          </a:fontRef>
+        </p:style>
+      </p:cxnSp>
+      <p:cxnSp>
+        <p:nvCxnSpPr>
+          <p:cNvPr id="189" name="Connecteur droit avec flèche 188">
+            <a:extLst>
+              <a:ext uri="{FF2B5EF4-FFF2-40B4-BE49-F238E27FC236}">
+                <a16:creationId xmlns:a16="http://schemas.microsoft.com/office/drawing/2014/main" id="{15F57C8A-F93E-4DC0-8EA6-C5AA53AF45C1}"/>
+              </a:ext>
+            </a:extLst>
+          </p:cNvPr>
+          <p:cNvCxnSpPr>
+            <a:cxnSpLocks/>
+          </p:cNvCxnSpPr>
+          <p:nvPr/>
+        </p:nvCxnSpPr>
+        <p:spPr>
+          <a:xfrm>
+            <a:off x="2226750" y="2920092"/>
+            <a:ext cx="0" cy="352869"/>
+          </a:xfrm>
+          <a:prstGeom prst="straightConnector1">
+            <a:avLst/>
+          </a:prstGeom>
+          <a:ln>
+            <a:tailEnd type="triangle"/>
+          </a:ln>
+        </p:spPr>
+        <p:style>
+          <a:lnRef idx="3">
+            <a:schemeClr val="accent6"/>
+          </a:lnRef>
+          <a:fillRef idx="0">
+            <a:schemeClr val="accent6"/>
+          </a:fillRef>
+          <a:effectRef idx="2">
+            <a:schemeClr val="accent6"/>
+          </a:effectRef>
+          <a:fontRef idx="minor">
+            <a:schemeClr val="tx1"/>
+          </a:fontRef>
+        </p:style>
+      </p:cxnSp>
+      <p:cxnSp>
+        <p:nvCxnSpPr>
+          <p:cNvPr id="190" name="Connecteur droit avec flèche 189">
+            <a:extLst>
+              <a:ext uri="{FF2B5EF4-FFF2-40B4-BE49-F238E27FC236}">
+                <a16:creationId xmlns:a16="http://schemas.microsoft.com/office/drawing/2014/main" id="{E078DED4-DB62-4485-B606-E5AB01FF9D1D}"/>
+              </a:ext>
+            </a:extLst>
+          </p:cNvPr>
+          <p:cNvCxnSpPr>
+            <a:cxnSpLocks/>
+          </p:cNvCxnSpPr>
+          <p:nvPr/>
+        </p:nvCxnSpPr>
+        <p:spPr>
+          <a:xfrm>
+            <a:off x="2226750" y="3556907"/>
+            <a:ext cx="0" cy="352869"/>
+          </a:xfrm>
+          <a:prstGeom prst="straightConnector1">
+            <a:avLst/>
+          </a:prstGeom>
+          <a:ln>
+            <a:tailEnd type="triangle"/>
+          </a:ln>
+        </p:spPr>
+        <p:style>
+          <a:lnRef idx="3">
+            <a:schemeClr val="accent6"/>
+          </a:lnRef>
+          <a:fillRef idx="0">
+            <a:schemeClr val="accent6"/>
+          </a:fillRef>
+          <a:effectRef idx="2">
+            <a:schemeClr val="accent6"/>
+          </a:effectRef>
+          <a:fontRef idx="minor">
+            <a:schemeClr val="tx1"/>
+          </a:fontRef>
+        </p:style>
+      </p:cxnSp>
+      <p:sp>
+        <p:nvSpPr>
+          <p:cNvPr id="195" name="ZoneTexte 194">
+            <a:extLst>
+              <a:ext uri="{FF2B5EF4-FFF2-40B4-BE49-F238E27FC236}">
+                <a16:creationId xmlns:a16="http://schemas.microsoft.com/office/drawing/2014/main" id="{E48642F3-75C2-47E8-A1D9-CA2DF45F5F0D}"/>
+              </a:ext>
+            </a:extLst>
+          </p:cNvPr>
+          <p:cNvSpPr txBox="1"/>
+          <p:nvPr/>
+        </p:nvSpPr>
+        <p:spPr>
+          <a:xfrm>
+            <a:off x="2247841" y="2965811"/>
+            <a:ext cx="907596" cy="276999"/>
+          </a:xfrm>
+          <a:prstGeom prst="rect">
+            <a:avLst/>
+          </a:prstGeom>
+          <a:noFill/>
+        </p:spPr>
+        <p:txBody>
+          <a:bodyPr wrap="square" rtlCol="0">
+            <a:spAutoFit/>
+          </a:bodyPr>
+          <a:lstStyle/>
+          <a:p>
+            <a:r>
+              <a:rPr lang="fr-FR" sz="1200" dirty="0">
+                <a:solidFill>
+                  <a:srgbClr val="00B050"/>
+                </a:solidFill>
+              </a:rPr>
+              <a:t>Wave</a:t>
+            </a:r>
+            <a:endParaRPr lang="fr-FR" dirty="0">
+              <a:solidFill>
+                <a:srgbClr val="00B050"/>
+              </a:solidFill>
+            </a:endParaRPr>
+          </a:p>
+        </p:txBody>
+      </p:sp>
+      <p:sp>
+        <p:nvSpPr>
+          <p:cNvPr id="196" name="ZoneTexte 195">
+            <a:extLst>
+              <a:ext uri="{FF2B5EF4-FFF2-40B4-BE49-F238E27FC236}">
+                <a16:creationId xmlns:a16="http://schemas.microsoft.com/office/drawing/2014/main" id="{8684DB02-31E7-492D-9406-DFF47E6E39FD}"/>
+              </a:ext>
+            </a:extLst>
+          </p:cNvPr>
+          <p:cNvSpPr txBox="1"/>
+          <p:nvPr/>
+        </p:nvSpPr>
+        <p:spPr>
+          <a:xfrm>
+            <a:off x="2247841" y="3557486"/>
+            <a:ext cx="907596" cy="276999"/>
+          </a:xfrm>
+          <a:prstGeom prst="rect">
+            <a:avLst/>
+          </a:prstGeom>
+          <a:noFill/>
+        </p:spPr>
+        <p:txBody>
+          <a:bodyPr wrap="square" rtlCol="0">
+            <a:spAutoFit/>
+          </a:bodyPr>
+          <a:lstStyle/>
+          <a:p>
+            <a:r>
+              <a:rPr lang="fr-FR" sz="1200" dirty="0">
+                <a:solidFill>
+                  <a:srgbClr val="00B050"/>
+                </a:solidFill>
+              </a:rPr>
+              <a:t>Soundfile</a:t>
+            </a:r>
+            <a:endParaRPr lang="fr-FR" dirty="0">
+              <a:solidFill>
+                <a:srgbClr val="00B050"/>
+              </a:solidFill>
+            </a:endParaRPr>
+          </a:p>
+        </p:txBody>
+      </p:sp>
+      <p:cxnSp>
+        <p:nvCxnSpPr>
+          <p:cNvPr id="197" name="Connecteur droit avec flèche 196">
+            <a:extLst>
+              <a:ext uri="{FF2B5EF4-FFF2-40B4-BE49-F238E27FC236}">
+                <a16:creationId xmlns:a16="http://schemas.microsoft.com/office/drawing/2014/main" id="{5E3F2DC0-D4A3-4806-BACD-3C56FB2ACDDE}"/>
+              </a:ext>
+            </a:extLst>
+          </p:cNvPr>
+          <p:cNvCxnSpPr>
+            <a:cxnSpLocks/>
+          </p:cNvCxnSpPr>
+          <p:nvPr/>
+        </p:nvCxnSpPr>
+        <p:spPr>
+          <a:xfrm>
+            <a:off x="2226750" y="4223873"/>
+            <a:ext cx="0" cy="352869"/>
+          </a:xfrm>
+          <a:prstGeom prst="straightConnector1">
+            <a:avLst/>
+          </a:prstGeom>
+          <a:ln>
+            <a:tailEnd type="triangle"/>
+          </a:ln>
+        </p:spPr>
+        <p:style>
+          <a:lnRef idx="3">
+            <a:schemeClr val="accent6"/>
+          </a:lnRef>
+          <a:fillRef idx="0">
+            <a:schemeClr val="accent6"/>
+          </a:fillRef>
+          <a:effectRef idx="2">
+            <a:schemeClr val="accent6"/>
+          </a:effectRef>
+          <a:fontRef idx="minor">
+            <a:schemeClr val="tx1"/>
+          </a:fontRef>
+        </p:style>
+      </p:cxnSp>
+      <p:sp>
+        <p:nvSpPr>
+          <p:cNvPr id="198" name="ZoneTexte 197">
+            <a:extLst>
+              <a:ext uri="{FF2B5EF4-FFF2-40B4-BE49-F238E27FC236}">
+                <a16:creationId xmlns:a16="http://schemas.microsoft.com/office/drawing/2014/main" id="{1E734E01-8819-445F-A819-DDC89EA6DD05}"/>
+              </a:ext>
+            </a:extLst>
+          </p:cNvPr>
+          <p:cNvSpPr txBox="1"/>
+          <p:nvPr/>
+        </p:nvSpPr>
+        <p:spPr>
+          <a:xfrm>
+            <a:off x="2247841" y="4242711"/>
+            <a:ext cx="907596" cy="276999"/>
+          </a:xfrm>
+          <a:prstGeom prst="rect">
+            <a:avLst/>
+          </a:prstGeom>
+          <a:noFill/>
+        </p:spPr>
+        <p:txBody>
+          <a:bodyPr wrap="square" rtlCol="0">
+            <a:spAutoFit/>
+          </a:bodyPr>
+          <a:lstStyle/>
+          <a:p>
+            <a:r>
+              <a:rPr lang="fr-FR" sz="1200" dirty="0">
+                <a:solidFill>
+                  <a:srgbClr val="00B050"/>
+                </a:solidFill>
+              </a:rPr>
+              <a:t>FFT</a:t>
+            </a:r>
+            <a:endParaRPr lang="fr-FR" dirty="0">
+              <a:solidFill>
+                <a:srgbClr val="00B050"/>
+              </a:solidFill>
+            </a:endParaRPr>
+          </a:p>
+        </p:txBody>
+      </p:sp>
+      <p:sp>
+        <p:nvSpPr>
+          <p:cNvPr id="199" name="ZoneTexte 198">
+            <a:extLst>
+              <a:ext uri="{FF2B5EF4-FFF2-40B4-BE49-F238E27FC236}">
+                <a16:creationId xmlns:a16="http://schemas.microsoft.com/office/drawing/2014/main" id="{0AAA3E49-1B08-4F68-BF8C-64ECB5E3339F}"/>
+              </a:ext>
+            </a:extLst>
+          </p:cNvPr>
+          <p:cNvSpPr txBox="1"/>
+          <p:nvPr/>
+        </p:nvSpPr>
+        <p:spPr>
+          <a:xfrm>
+            <a:off x="2809295" y="5014636"/>
+            <a:ext cx="1047245" cy="276999"/>
+          </a:xfrm>
+          <a:prstGeom prst="rect">
+            <a:avLst/>
+          </a:prstGeom>
+          <a:noFill/>
+        </p:spPr>
+        <p:txBody>
+          <a:bodyPr wrap="square" rtlCol="0">
+            <a:spAutoFit/>
+          </a:bodyPr>
+          <a:lstStyle/>
+          <a:p>
+            <a:r>
+              <a:rPr lang="fr-FR" sz="1200" dirty="0">
+                <a:solidFill>
+                  <a:srgbClr val="FF0000"/>
+                </a:solidFill>
+              </a:rPr>
+              <a:t>Fréquence</a:t>
+            </a:r>
+            <a:endParaRPr lang="fr-FR" dirty="0">
+              <a:solidFill>
+                <a:srgbClr val="FF0000"/>
+              </a:solidFill>
+            </a:endParaRPr>
+          </a:p>
+        </p:txBody>
+      </p:sp>
+      <p:sp>
+        <p:nvSpPr>
+          <p:cNvPr id="200" name="ZoneTexte 199">
+            <a:extLst>
+              <a:ext uri="{FF2B5EF4-FFF2-40B4-BE49-F238E27FC236}">
+                <a16:creationId xmlns:a16="http://schemas.microsoft.com/office/drawing/2014/main" id="{78407748-532E-457B-A880-F176A81D061C}"/>
+              </a:ext>
+            </a:extLst>
+          </p:cNvPr>
+          <p:cNvSpPr txBox="1"/>
+          <p:nvPr/>
+        </p:nvSpPr>
+        <p:spPr>
+          <a:xfrm>
+            <a:off x="3681185" y="4703455"/>
+            <a:ext cx="907596" cy="276999"/>
+          </a:xfrm>
+          <a:prstGeom prst="rect">
+            <a:avLst/>
+          </a:prstGeom>
+          <a:noFill/>
+        </p:spPr>
+        <p:txBody>
+          <a:bodyPr wrap="square" rtlCol="0">
+            <a:spAutoFit/>
+          </a:bodyPr>
+          <a:lstStyle/>
+          <a:p>
+            <a:r>
+              <a:rPr lang="fr-FR" sz="1200" dirty="0">
+                <a:solidFill>
+                  <a:srgbClr val="00B0F0"/>
+                </a:solidFill>
+              </a:rPr>
+              <a:t>Note</a:t>
+            </a:r>
+            <a:endParaRPr lang="fr-FR" dirty="0">
+              <a:solidFill>
+                <a:srgbClr val="00B0F0"/>
+              </a:solidFill>
+            </a:endParaRPr>
+          </a:p>
+        </p:txBody>
+      </p:sp>
+      <p:cxnSp>
+        <p:nvCxnSpPr>
+          <p:cNvPr id="201" name="Connecteur droit avec flèche 200">
+            <a:extLst>
+              <a:ext uri="{FF2B5EF4-FFF2-40B4-BE49-F238E27FC236}">
+                <a16:creationId xmlns:a16="http://schemas.microsoft.com/office/drawing/2014/main" id="{9290FED1-64B3-4939-9D71-709B8CE8DA08}"/>
+              </a:ext>
+            </a:extLst>
+          </p:cNvPr>
+          <p:cNvCxnSpPr>
+            <a:cxnSpLocks/>
+          </p:cNvCxnSpPr>
+          <p:nvPr/>
+        </p:nvCxnSpPr>
+        <p:spPr>
+          <a:xfrm>
+            <a:off x="3470361" y="4974037"/>
+            <a:ext cx="421648" cy="258652"/>
+          </a:xfrm>
+          <a:prstGeom prst="straightConnector1">
+            <a:avLst/>
+          </a:prstGeom>
+          <a:ln w="12700">
+            <a:solidFill>
+              <a:srgbClr val="FF0000"/>
+            </a:solidFill>
+            <a:tailEnd type="triangle"/>
+          </a:ln>
+        </p:spPr>
+        <p:style>
+          <a:lnRef idx="3">
+            <a:schemeClr val="accent6"/>
+          </a:lnRef>
+          <a:fillRef idx="0">
+            <a:schemeClr val="accent6"/>
+          </a:fillRef>
+          <a:effectRef idx="2">
+            <a:schemeClr val="accent6"/>
+          </a:effectRef>
+          <a:fontRef idx="minor">
+            <a:schemeClr val="tx1"/>
+          </a:fontRef>
+        </p:style>
+      </p:cxnSp>
+      <p:cxnSp>
+        <p:nvCxnSpPr>
+          <p:cNvPr id="205" name="Connecteur droit avec flèche 204">
+            <a:extLst>
+              <a:ext uri="{FF2B5EF4-FFF2-40B4-BE49-F238E27FC236}">
+                <a16:creationId xmlns:a16="http://schemas.microsoft.com/office/drawing/2014/main" id="{89DA885B-7456-4BCF-B3DD-DF78977FAFB4}"/>
+              </a:ext>
+            </a:extLst>
+          </p:cNvPr>
+          <p:cNvCxnSpPr>
+            <a:cxnSpLocks/>
+          </p:cNvCxnSpPr>
+          <p:nvPr/>
+        </p:nvCxnSpPr>
+        <p:spPr>
+          <a:xfrm flipH="1" flipV="1">
+            <a:off x="3583781" y="4860372"/>
+            <a:ext cx="417181" cy="263832"/>
+          </a:xfrm>
+          <a:prstGeom prst="straightConnector1">
+            <a:avLst/>
+          </a:prstGeom>
+          <a:ln w="12700">
+            <a:solidFill>
+              <a:srgbClr val="00B0F0"/>
+            </a:solidFill>
+            <a:tailEnd type="triangle"/>
+          </a:ln>
+        </p:spPr>
+        <p:style>
+          <a:lnRef idx="3">
+            <a:schemeClr val="accent6"/>
+          </a:lnRef>
+          <a:fillRef idx="0">
+            <a:schemeClr val="accent6"/>
+          </a:fillRef>
+          <a:effectRef idx="2">
+            <a:schemeClr val="accent6"/>
+          </a:effectRef>
+          <a:fontRef idx="minor">
+            <a:schemeClr val="tx1"/>
+          </a:fontRef>
+        </p:style>
+      </p:cxnSp>
+      <p:pic>
+        <p:nvPicPr>
+          <p:cNvPr id="210" name="Picture 2" descr="Icones Engrenage, images Engrenages png et ico">
+            <a:extLst>
+              <a:ext uri="{FF2B5EF4-FFF2-40B4-BE49-F238E27FC236}">
+                <a16:creationId xmlns:a16="http://schemas.microsoft.com/office/drawing/2014/main" id="{3DC9704F-A437-4A08-8FFB-A502A229CC51}"/>
+              </a:ext>
+            </a:extLst>
+          </p:cNvPr>
+          <p:cNvPicPr>
+            <a:picLocks noChangeAspect="1" noChangeArrowheads="1"/>
+          </p:cNvPicPr>
+          <p:nvPr/>
+        </p:nvPicPr>
+        <p:blipFill>
+          <a:blip r:embed="rId2">
+            <a:duotone>
+              <a:schemeClr val="accent6">
+                <a:shade val="45000"/>
+                <a:satMod val="135000"/>
+              </a:schemeClr>
+              <a:prstClr val="white"/>
+            </a:duotone>
+            <a:extLst>
+              <a:ext uri="{28A0092B-C50C-407E-A947-70E740481C1C}">
+                <a14:useLocalDpi xmlns:a14="http://schemas.microsoft.com/office/drawing/2010/main" val="0"/>
+              </a:ext>
+            </a:extLst>
+          </a:blip>
+          <a:srcRect/>
+          <a:stretch>
+            <a:fillRect/>
+          </a:stretch>
+        </p:blipFill>
+        <p:spPr bwMode="auto">
+          <a:xfrm>
+            <a:off x="4468625" y="6060310"/>
+            <a:ext cx="587118" cy="587118"/>
+          </a:xfrm>
+          <a:prstGeom prst="rect">
+            <a:avLst/>
+          </a:prstGeom>
+          <a:noFill/>
+          <a:extLst>
+            <a:ext uri="{909E8E84-426E-40DD-AFC4-6F175D3DCCD1}">
+              <a14:hiddenFill xmlns:a14="http://schemas.microsoft.com/office/drawing/2010/main">
+                <a:solidFill>
+                  <a:srgbClr val="FFFFFF"/>
+                </a:solidFill>
+              </a14:hiddenFill>
+            </a:ext>
+          </a:extLst>
+        </p:spPr>
+      </p:pic>
+      <p:sp>
+        <p:nvSpPr>
+          <p:cNvPr id="234" name="ZoneTexte 233">
+            <a:extLst>
+              <a:ext uri="{FF2B5EF4-FFF2-40B4-BE49-F238E27FC236}">
+                <a16:creationId xmlns:a16="http://schemas.microsoft.com/office/drawing/2014/main" id="{968F1644-1A65-4DB3-BE6C-FA482F6761E7}"/>
+              </a:ext>
+            </a:extLst>
+          </p:cNvPr>
+          <p:cNvSpPr txBox="1"/>
+          <p:nvPr/>
+        </p:nvSpPr>
+        <p:spPr>
+          <a:xfrm>
+            <a:off x="5610872" y="1478276"/>
+            <a:ext cx="1857375" cy="369332"/>
+          </a:xfrm>
+          <a:prstGeom prst="rect">
+            <a:avLst/>
+          </a:prstGeom>
+          <a:noFill/>
+        </p:spPr>
+        <p:txBody>
+          <a:bodyPr wrap="square" rtlCol="0">
+            <a:spAutoFit/>
+          </a:bodyPr>
+          <a:lstStyle/>
+          <a:p>
+            <a:pPr algn="ctr"/>
+            <a:r>
+              <a:rPr lang="fr-FR" dirty="0"/>
+              <a:t>Partition.py</a:t>
+            </a:r>
+          </a:p>
+        </p:txBody>
+      </p:sp>
+      <p:cxnSp>
+        <p:nvCxnSpPr>
+          <p:cNvPr id="263" name="Connecteur droit 262">
+            <a:extLst>
+              <a:ext uri="{FF2B5EF4-FFF2-40B4-BE49-F238E27FC236}">
+                <a16:creationId xmlns:a16="http://schemas.microsoft.com/office/drawing/2014/main" id="{EA3A68FD-C933-4D23-B2C3-4732B42AFD35}"/>
+              </a:ext>
+            </a:extLst>
+          </p:cNvPr>
+          <p:cNvCxnSpPr>
+            <a:cxnSpLocks/>
+            <a:stCxn id="51" idx="2"/>
+            <a:endCxn id="234" idx="2"/>
+          </p:cNvCxnSpPr>
+          <p:nvPr/>
+        </p:nvCxnSpPr>
+        <p:spPr>
+          <a:xfrm flipV="1">
+            <a:off x="6526095" y="1847608"/>
+            <a:ext cx="13465" cy="2827130"/>
+          </a:xfrm>
+          <a:prstGeom prst="line">
+            <a:avLst/>
+          </a:prstGeom>
+          <a:ln w="19050">
+            <a:solidFill>
+              <a:schemeClr val="accent6"/>
+            </a:solidFill>
+          </a:ln>
+        </p:spPr>
+        <p:style>
+          <a:lnRef idx="1">
+            <a:schemeClr val="accent1"/>
+          </a:lnRef>
+          <a:fillRef idx="0">
+            <a:schemeClr val="accent1"/>
+          </a:fillRef>
+          <a:effectRef idx="0">
+            <a:schemeClr val="accent1"/>
+          </a:effectRef>
+          <a:fontRef idx="minor">
+            <a:schemeClr val="tx1"/>
+          </a:fontRef>
+        </p:style>
+      </p:cxnSp>
+      <p:sp>
+        <p:nvSpPr>
+          <p:cNvPr id="266" name="ZoneTexte 265">
+            <a:extLst>
+              <a:ext uri="{FF2B5EF4-FFF2-40B4-BE49-F238E27FC236}">
+                <a16:creationId xmlns:a16="http://schemas.microsoft.com/office/drawing/2014/main" id="{DC52B5AE-F855-42CC-8ECE-130A4BFCC4F2}"/>
+              </a:ext>
+            </a:extLst>
+          </p:cNvPr>
+          <p:cNvSpPr txBox="1"/>
+          <p:nvPr/>
+        </p:nvSpPr>
+        <p:spPr>
+          <a:xfrm>
+            <a:off x="4481215" y="1977104"/>
+            <a:ext cx="2162172" cy="2246769"/>
+          </a:xfrm>
+          <a:prstGeom prst="rect">
+            <a:avLst/>
+          </a:prstGeom>
+          <a:noFill/>
+        </p:spPr>
+        <p:txBody>
+          <a:bodyPr wrap="square" rtlCol="0">
+            <a:spAutoFit/>
+          </a:bodyPr>
+          <a:lstStyle/>
+          <a:p>
+            <a:r>
+              <a:rPr lang="fr-FR" sz="1400" dirty="0"/>
+              <a:t>Enregistrement fichier</a:t>
+            </a:r>
+          </a:p>
+          <a:p>
+            <a:endParaRPr lang="fr-FR" sz="1400" dirty="0"/>
+          </a:p>
+          <a:p>
+            <a:endParaRPr lang="fr-FR" sz="1400" dirty="0"/>
+          </a:p>
+          <a:p>
+            <a:r>
+              <a:rPr lang="fr-FR" sz="1400" dirty="0"/>
+              <a:t>Ouverture fichier</a:t>
+            </a:r>
+          </a:p>
+          <a:p>
+            <a:endParaRPr lang="fr-FR" sz="1400" dirty="0"/>
+          </a:p>
+          <a:p>
+            <a:endParaRPr lang="fr-FR" sz="1400" dirty="0"/>
+          </a:p>
+          <a:p>
+            <a:r>
+              <a:rPr lang="fr-FR" sz="1400" dirty="0"/>
+              <a:t>Lecture fichier</a:t>
+            </a:r>
+          </a:p>
+          <a:p>
+            <a:endParaRPr lang="fr-FR" sz="1400" dirty="0"/>
+          </a:p>
+          <a:p>
+            <a:endParaRPr lang="fr-FR" sz="1400" dirty="0"/>
+          </a:p>
+          <a:p>
+            <a:r>
+              <a:rPr lang="fr-FR" sz="1400" dirty="0"/>
+              <a:t>Recherche fréquence</a:t>
+            </a:r>
+          </a:p>
+        </p:txBody>
+      </p:sp>
+      <p:sp>
+        <p:nvSpPr>
+          <p:cNvPr id="267" name="ZoneTexte 266">
+            <a:extLst>
+              <a:ext uri="{FF2B5EF4-FFF2-40B4-BE49-F238E27FC236}">
+                <a16:creationId xmlns:a16="http://schemas.microsoft.com/office/drawing/2014/main" id="{A7A81159-7398-429F-BDE7-16467DB93B18}"/>
+              </a:ext>
+            </a:extLst>
+          </p:cNvPr>
+          <p:cNvSpPr txBox="1"/>
+          <p:nvPr/>
+        </p:nvSpPr>
+        <p:spPr>
+          <a:xfrm>
+            <a:off x="4654704" y="2299441"/>
+            <a:ext cx="907596" cy="276999"/>
+          </a:xfrm>
+          <a:prstGeom prst="rect">
+            <a:avLst/>
+          </a:prstGeom>
+          <a:noFill/>
+        </p:spPr>
+        <p:txBody>
+          <a:bodyPr wrap="square" rtlCol="0">
+            <a:spAutoFit/>
+          </a:bodyPr>
+          <a:lstStyle/>
+          <a:p>
+            <a:r>
+              <a:rPr lang="fr-FR" sz="1200" dirty="0">
+                <a:solidFill>
+                  <a:srgbClr val="00B050"/>
+                </a:solidFill>
+              </a:rPr>
+              <a:t>PyAudio</a:t>
+            </a:r>
+            <a:endParaRPr lang="fr-FR" dirty="0">
+              <a:solidFill>
+                <a:srgbClr val="00B050"/>
+              </a:solidFill>
+            </a:endParaRPr>
+          </a:p>
+        </p:txBody>
+      </p:sp>
+      <p:cxnSp>
+        <p:nvCxnSpPr>
+          <p:cNvPr id="268" name="Connecteur droit avec flèche 267">
+            <a:extLst>
+              <a:ext uri="{FF2B5EF4-FFF2-40B4-BE49-F238E27FC236}">
+                <a16:creationId xmlns:a16="http://schemas.microsoft.com/office/drawing/2014/main" id="{BF22F436-0652-4404-A4BE-A79186B8D4B7}"/>
+              </a:ext>
+            </a:extLst>
+          </p:cNvPr>
+          <p:cNvCxnSpPr>
+            <a:cxnSpLocks/>
+          </p:cNvCxnSpPr>
+          <p:nvPr/>
+        </p:nvCxnSpPr>
+        <p:spPr>
+          <a:xfrm>
+            <a:off x="4633613" y="2261507"/>
+            <a:ext cx="0" cy="352869"/>
+          </a:xfrm>
+          <a:prstGeom prst="straightConnector1">
+            <a:avLst/>
+          </a:prstGeom>
+          <a:ln>
+            <a:tailEnd type="triangle"/>
+          </a:ln>
+        </p:spPr>
+        <p:style>
+          <a:lnRef idx="3">
+            <a:schemeClr val="accent6"/>
+          </a:lnRef>
+          <a:fillRef idx="0">
+            <a:schemeClr val="accent6"/>
+          </a:fillRef>
+          <a:effectRef idx="2">
+            <a:schemeClr val="accent6"/>
+          </a:effectRef>
+          <a:fontRef idx="minor">
+            <a:schemeClr val="tx1"/>
+          </a:fontRef>
+        </p:style>
+      </p:cxnSp>
+      <p:cxnSp>
+        <p:nvCxnSpPr>
+          <p:cNvPr id="269" name="Connecteur droit avec flèche 268">
+            <a:extLst>
+              <a:ext uri="{FF2B5EF4-FFF2-40B4-BE49-F238E27FC236}">
+                <a16:creationId xmlns:a16="http://schemas.microsoft.com/office/drawing/2014/main" id="{EFD266EB-6460-40CE-AD2A-44532B57FE6B}"/>
+              </a:ext>
+            </a:extLst>
+          </p:cNvPr>
+          <p:cNvCxnSpPr>
+            <a:cxnSpLocks/>
+          </p:cNvCxnSpPr>
+          <p:nvPr/>
+        </p:nvCxnSpPr>
+        <p:spPr>
+          <a:xfrm>
+            <a:off x="4633613" y="2920092"/>
+            <a:ext cx="0" cy="352869"/>
+          </a:xfrm>
+          <a:prstGeom prst="straightConnector1">
+            <a:avLst/>
+          </a:prstGeom>
+          <a:ln>
+            <a:tailEnd type="triangle"/>
+          </a:ln>
+        </p:spPr>
+        <p:style>
+          <a:lnRef idx="3">
+            <a:schemeClr val="accent6"/>
+          </a:lnRef>
+          <a:fillRef idx="0">
+            <a:schemeClr val="accent6"/>
+          </a:fillRef>
+          <a:effectRef idx="2">
+            <a:schemeClr val="accent6"/>
+          </a:effectRef>
+          <a:fontRef idx="minor">
+            <a:schemeClr val="tx1"/>
+          </a:fontRef>
+        </p:style>
+      </p:cxnSp>
+      <p:cxnSp>
+        <p:nvCxnSpPr>
+          <p:cNvPr id="270" name="Connecteur droit avec flèche 269">
+            <a:extLst>
+              <a:ext uri="{FF2B5EF4-FFF2-40B4-BE49-F238E27FC236}">
+                <a16:creationId xmlns:a16="http://schemas.microsoft.com/office/drawing/2014/main" id="{45220910-FCA5-4C27-B2CD-BD1E2AF4A49B}"/>
+              </a:ext>
+            </a:extLst>
+          </p:cNvPr>
+          <p:cNvCxnSpPr>
+            <a:cxnSpLocks/>
+          </p:cNvCxnSpPr>
+          <p:nvPr/>
+        </p:nvCxnSpPr>
+        <p:spPr>
+          <a:xfrm>
+            <a:off x="4633613" y="3556907"/>
+            <a:ext cx="0" cy="352869"/>
+          </a:xfrm>
+          <a:prstGeom prst="straightConnector1">
+            <a:avLst/>
+          </a:prstGeom>
+          <a:ln>
+            <a:tailEnd type="triangle"/>
+          </a:ln>
+        </p:spPr>
+        <p:style>
+          <a:lnRef idx="3">
+            <a:schemeClr val="accent6"/>
+          </a:lnRef>
+          <a:fillRef idx="0">
+            <a:schemeClr val="accent6"/>
+          </a:fillRef>
+          <a:effectRef idx="2">
+            <a:schemeClr val="accent6"/>
+          </a:effectRef>
+          <a:fontRef idx="minor">
+            <a:schemeClr val="tx1"/>
+          </a:fontRef>
+        </p:style>
+      </p:cxnSp>
+      <p:sp>
+        <p:nvSpPr>
+          <p:cNvPr id="271" name="ZoneTexte 270">
+            <a:extLst>
+              <a:ext uri="{FF2B5EF4-FFF2-40B4-BE49-F238E27FC236}">
+                <a16:creationId xmlns:a16="http://schemas.microsoft.com/office/drawing/2014/main" id="{C6F44835-C9AA-407A-B648-FF4CE0BDCAB0}"/>
+              </a:ext>
+            </a:extLst>
+          </p:cNvPr>
+          <p:cNvSpPr txBox="1"/>
+          <p:nvPr/>
+        </p:nvSpPr>
+        <p:spPr>
+          <a:xfrm>
+            <a:off x="4654704" y="2965811"/>
+            <a:ext cx="907596" cy="276999"/>
+          </a:xfrm>
+          <a:prstGeom prst="rect">
+            <a:avLst/>
+          </a:prstGeom>
+          <a:noFill/>
+        </p:spPr>
+        <p:txBody>
+          <a:bodyPr wrap="square" rtlCol="0">
+            <a:spAutoFit/>
+          </a:bodyPr>
+          <a:lstStyle/>
+          <a:p>
+            <a:r>
+              <a:rPr lang="fr-FR" sz="1200" dirty="0">
+                <a:solidFill>
+                  <a:srgbClr val="00B050"/>
+                </a:solidFill>
+              </a:rPr>
+              <a:t>Wave</a:t>
+            </a:r>
+            <a:endParaRPr lang="fr-FR" dirty="0">
+              <a:solidFill>
+                <a:srgbClr val="00B050"/>
+              </a:solidFill>
+            </a:endParaRPr>
+          </a:p>
+        </p:txBody>
+      </p:sp>
+      <p:sp>
+        <p:nvSpPr>
+          <p:cNvPr id="272" name="ZoneTexte 271">
+            <a:extLst>
+              <a:ext uri="{FF2B5EF4-FFF2-40B4-BE49-F238E27FC236}">
+                <a16:creationId xmlns:a16="http://schemas.microsoft.com/office/drawing/2014/main" id="{2D53ADD3-661A-4504-90EE-E27A13D33593}"/>
+              </a:ext>
+            </a:extLst>
+          </p:cNvPr>
+          <p:cNvSpPr txBox="1"/>
+          <p:nvPr/>
+        </p:nvSpPr>
+        <p:spPr>
+          <a:xfrm>
+            <a:off x="4654704" y="3557486"/>
+            <a:ext cx="907596" cy="276999"/>
+          </a:xfrm>
+          <a:prstGeom prst="rect">
+            <a:avLst/>
+          </a:prstGeom>
+          <a:noFill/>
+        </p:spPr>
+        <p:txBody>
+          <a:bodyPr wrap="square" rtlCol="0">
+            <a:spAutoFit/>
+          </a:bodyPr>
+          <a:lstStyle/>
+          <a:p>
+            <a:r>
+              <a:rPr lang="fr-FR" sz="1200" dirty="0">
+                <a:solidFill>
+                  <a:srgbClr val="00B050"/>
+                </a:solidFill>
+              </a:rPr>
+              <a:t>Soundfile</a:t>
+            </a:r>
+            <a:endParaRPr lang="fr-FR" dirty="0">
+              <a:solidFill>
+                <a:srgbClr val="00B050"/>
+              </a:solidFill>
+            </a:endParaRPr>
+          </a:p>
+        </p:txBody>
+      </p:sp>
+      <p:cxnSp>
+        <p:nvCxnSpPr>
+          <p:cNvPr id="273" name="Connecteur droit avec flèche 272">
+            <a:extLst>
+              <a:ext uri="{FF2B5EF4-FFF2-40B4-BE49-F238E27FC236}">
+                <a16:creationId xmlns:a16="http://schemas.microsoft.com/office/drawing/2014/main" id="{0EA2BED2-7303-483B-8772-772D4ABE7197}"/>
+              </a:ext>
+            </a:extLst>
+          </p:cNvPr>
+          <p:cNvCxnSpPr>
+            <a:cxnSpLocks/>
+          </p:cNvCxnSpPr>
+          <p:nvPr/>
+        </p:nvCxnSpPr>
+        <p:spPr>
+          <a:xfrm>
+            <a:off x="4633613" y="4223873"/>
+            <a:ext cx="0" cy="352869"/>
+          </a:xfrm>
+          <a:prstGeom prst="straightConnector1">
+            <a:avLst/>
+          </a:prstGeom>
+          <a:ln>
+            <a:tailEnd type="triangle"/>
+          </a:ln>
+        </p:spPr>
+        <p:style>
+          <a:lnRef idx="3">
+            <a:schemeClr val="accent6"/>
+          </a:lnRef>
+          <a:fillRef idx="0">
+            <a:schemeClr val="accent6"/>
+          </a:fillRef>
+          <a:effectRef idx="2">
+            <a:schemeClr val="accent6"/>
+          </a:effectRef>
+          <a:fontRef idx="minor">
+            <a:schemeClr val="tx1"/>
+          </a:fontRef>
+        </p:style>
+      </p:cxnSp>
+      <p:sp>
+        <p:nvSpPr>
+          <p:cNvPr id="274" name="ZoneTexte 273">
+            <a:extLst>
+              <a:ext uri="{FF2B5EF4-FFF2-40B4-BE49-F238E27FC236}">
+                <a16:creationId xmlns:a16="http://schemas.microsoft.com/office/drawing/2014/main" id="{289C209C-831A-4D08-81B3-827A1695BD17}"/>
+              </a:ext>
+            </a:extLst>
+          </p:cNvPr>
+          <p:cNvSpPr txBox="1"/>
+          <p:nvPr/>
+        </p:nvSpPr>
+        <p:spPr>
+          <a:xfrm>
+            <a:off x="4654704" y="4242711"/>
+            <a:ext cx="907596" cy="276999"/>
+          </a:xfrm>
+          <a:prstGeom prst="rect">
+            <a:avLst/>
+          </a:prstGeom>
+          <a:noFill/>
+        </p:spPr>
+        <p:txBody>
+          <a:bodyPr wrap="square" rtlCol="0">
+            <a:spAutoFit/>
+          </a:bodyPr>
+          <a:lstStyle/>
+          <a:p>
+            <a:r>
+              <a:rPr lang="fr-FR" sz="1200" dirty="0">
+                <a:solidFill>
+                  <a:srgbClr val="00B050"/>
+                </a:solidFill>
+              </a:rPr>
+              <a:t>FFT</a:t>
+            </a:r>
+            <a:endParaRPr lang="fr-FR" dirty="0">
+              <a:solidFill>
+                <a:srgbClr val="00B050"/>
+              </a:solidFill>
+            </a:endParaRPr>
+          </a:p>
+        </p:txBody>
+      </p:sp>
+      <p:sp>
+        <p:nvSpPr>
+          <p:cNvPr id="303" name="ZoneTexte 302">
+            <a:extLst>
+              <a:ext uri="{FF2B5EF4-FFF2-40B4-BE49-F238E27FC236}">
+                <a16:creationId xmlns:a16="http://schemas.microsoft.com/office/drawing/2014/main" id="{7B8A6FCC-005F-498E-9071-86A066236927}"/>
+              </a:ext>
+            </a:extLst>
+          </p:cNvPr>
+          <p:cNvSpPr txBox="1"/>
+          <p:nvPr/>
+        </p:nvSpPr>
+        <p:spPr>
+          <a:xfrm>
+            <a:off x="4754864" y="4831069"/>
+            <a:ext cx="1047245" cy="276999"/>
+          </a:xfrm>
+          <a:prstGeom prst="rect">
+            <a:avLst/>
+          </a:prstGeom>
+          <a:noFill/>
+        </p:spPr>
+        <p:txBody>
+          <a:bodyPr wrap="square" rtlCol="0">
+            <a:spAutoFit/>
+          </a:bodyPr>
+          <a:lstStyle/>
+          <a:p>
+            <a:r>
+              <a:rPr lang="fr-FR" sz="1200" dirty="0">
+                <a:solidFill>
+                  <a:srgbClr val="FF0000"/>
+                </a:solidFill>
+              </a:rPr>
+              <a:t>Fréquences</a:t>
+            </a:r>
+            <a:endParaRPr lang="fr-FR" dirty="0">
+              <a:solidFill>
+                <a:srgbClr val="FF0000"/>
+              </a:solidFill>
+            </a:endParaRPr>
+          </a:p>
+        </p:txBody>
+      </p:sp>
+      <p:cxnSp>
+        <p:nvCxnSpPr>
+          <p:cNvPr id="304" name="Connecteur droit avec flèche 303">
+            <a:extLst>
+              <a:ext uri="{FF2B5EF4-FFF2-40B4-BE49-F238E27FC236}">
+                <a16:creationId xmlns:a16="http://schemas.microsoft.com/office/drawing/2014/main" id="{1D50D154-2DBA-46FB-BDED-FF582296C250}"/>
+              </a:ext>
+            </a:extLst>
+          </p:cNvPr>
+          <p:cNvCxnSpPr>
+            <a:cxnSpLocks/>
+          </p:cNvCxnSpPr>
+          <p:nvPr/>
+        </p:nvCxnSpPr>
+        <p:spPr>
+          <a:xfrm flipH="1">
+            <a:off x="5406227" y="4923823"/>
+            <a:ext cx="520640" cy="305716"/>
+          </a:xfrm>
+          <a:prstGeom prst="straightConnector1">
+            <a:avLst/>
+          </a:prstGeom>
+          <a:ln w="12700">
+            <a:solidFill>
+              <a:srgbClr val="FF0000"/>
+            </a:solidFill>
+            <a:tailEnd type="triangle"/>
+          </a:ln>
+        </p:spPr>
+        <p:style>
+          <a:lnRef idx="3">
+            <a:schemeClr val="accent6"/>
+          </a:lnRef>
+          <a:fillRef idx="0">
+            <a:schemeClr val="accent6"/>
+          </a:fillRef>
+          <a:effectRef idx="2">
+            <a:schemeClr val="accent6"/>
+          </a:effectRef>
+          <a:fontRef idx="minor">
+            <a:schemeClr val="tx1"/>
+          </a:fontRef>
+        </p:style>
+      </p:cxnSp>
+      <p:cxnSp>
+        <p:nvCxnSpPr>
+          <p:cNvPr id="308" name="Connecteur droit avec flèche 307">
+            <a:extLst>
+              <a:ext uri="{FF2B5EF4-FFF2-40B4-BE49-F238E27FC236}">
+                <a16:creationId xmlns:a16="http://schemas.microsoft.com/office/drawing/2014/main" id="{D42D7F8C-D2A6-418B-A4A8-E64C511E5EDE}"/>
+              </a:ext>
+            </a:extLst>
+          </p:cNvPr>
+          <p:cNvCxnSpPr>
+            <a:cxnSpLocks/>
+          </p:cNvCxnSpPr>
+          <p:nvPr/>
+        </p:nvCxnSpPr>
+        <p:spPr>
+          <a:xfrm flipV="1">
+            <a:off x="5523264" y="5042883"/>
+            <a:ext cx="522730" cy="297581"/>
+          </a:xfrm>
+          <a:prstGeom prst="straightConnector1">
+            <a:avLst/>
+          </a:prstGeom>
+          <a:ln w="12700">
+            <a:solidFill>
+              <a:srgbClr val="00B0F0"/>
+            </a:solidFill>
+            <a:tailEnd type="triangle"/>
+          </a:ln>
+        </p:spPr>
+        <p:style>
+          <a:lnRef idx="3">
+            <a:schemeClr val="accent6"/>
+          </a:lnRef>
+          <a:fillRef idx="0">
+            <a:schemeClr val="accent6"/>
+          </a:fillRef>
+          <a:effectRef idx="2">
+            <a:schemeClr val="accent6"/>
+          </a:effectRef>
+          <a:fontRef idx="minor">
+            <a:schemeClr val="tx1"/>
+          </a:fontRef>
+        </p:style>
+      </p:cxnSp>
+      <p:sp>
+        <p:nvSpPr>
+          <p:cNvPr id="311" name="ZoneTexte 310">
+            <a:extLst>
+              <a:ext uri="{FF2B5EF4-FFF2-40B4-BE49-F238E27FC236}">
+                <a16:creationId xmlns:a16="http://schemas.microsoft.com/office/drawing/2014/main" id="{F1FDF347-01CD-4859-AB43-8261EFBD9DB6}"/>
+              </a:ext>
+            </a:extLst>
+          </p:cNvPr>
+          <p:cNvSpPr txBox="1"/>
+          <p:nvPr/>
+        </p:nvSpPr>
+        <p:spPr>
+          <a:xfrm>
+            <a:off x="5764371" y="5116223"/>
+            <a:ext cx="907596" cy="461665"/>
+          </a:xfrm>
+          <a:prstGeom prst="rect">
+            <a:avLst/>
+          </a:prstGeom>
+          <a:noFill/>
+        </p:spPr>
+        <p:txBody>
+          <a:bodyPr wrap="square" rtlCol="0">
+            <a:spAutoFit/>
+          </a:bodyPr>
+          <a:lstStyle/>
+          <a:p>
+            <a:r>
+              <a:rPr lang="fr-FR" sz="1200" dirty="0">
+                <a:solidFill>
+                  <a:srgbClr val="00B0F0"/>
+                </a:solidFill>
+              </a:rPr>
+              <a:t>Tableaux de note</a:t>
+            </a:r>
+            <a:endParaRPr lang="fr-FR" dirty="0">
+              <a:solidFill>
+                <a:srgbClr val="00B0F0"/>
+              </a:solidFill>
+            </a:endParaRPr>
+          </a:p>
+        </p:txBody>
+      </p:sp>
+      <p:sp>
+        <p:nvSpPr>
+          <p:cNvPr id="312" name="ZoneTexte 311">
+            <a:extLst>
+              <a:ext uri="{FF2B5EF4-FFF2-40B4-BE49-F238E27FC236}">
+                <a16:creationId xmlns:a16="http://schemas.microsoft.com/office/drawing/2014/main" id="{04D6BC30-1080-4E75-A822-DE57854E24A4}"/>
+              </a:ext>
+            </a:extLst>
+          </p:cNvPr>
+          <p:cNvSpPr txBox="1"/>
+          <p:nvPr/>
+        </p:nvSpPr>
+        <p:spPr>
+          <a:xfrm>
+            <a:off x="6539559" y="2002548"/>
+            <a:ext cx="1892481" cy="1600438"/>
+          </a:xfrm>
+          <a:prstGeom prst="rect">
+            <a:avLst/>
+          </a:prstGeom>
+          <a:noFill/>
+        </p:spPr>
+        <p:txBody>
+          <a:bodyPr wrap="square" rtlCol="0">
+            <a:spAutoFit/>
+          </a:bodyPr>
+          <a:lstStyle/>
+          <a:p>
+            <a:r>
+              <a:rPr lang="fr-FR" sz="1400" dirty="0">
+                <a:solidFill>
+                  <a:srgbClr val="00B0F0"/>
+                </a:solidFill>
+              </a:rPr>
+              <a:t>Tableaux de note</a:t>
+            </a:r>
+          </a:p>
+          <a:p>
+            <a:endParaRPr lang="fr-FR" sz="1400" dirty="0">
+              <a:solidFill>
+                <a:srgbClr val="00B0F0"/>
+              </a:solidFill>
+            </a:endParaRPr>
+          </a:p>
+          <a:p>
+            <a:endParaRPr lang="fr-FR" sz="1400" dirty="0">
+              <a:solidFill>
+                <a:srgbClr val="00B0F0"/>
+              </a:solidFill>
+            </a:endParaRPr>
+          </a:p>
+          <a:p>
+            <a:r>
+              <a:rPr lang="fr-FR" sz="1400" dirty="0"/>
+              <a:t>Fichier MIDI</a:t>
+            </a:r>
+          </a:p>
+          <a:p>
+            <a:endParaRPr lang="fr-FR" sz="1400" dirty="0"/>
+          </a:p>
+          <a:p>
+            <a:endParaRPr lang="fr-FR" sz="1400" dirty="0"/>
+          </a:p>
+          <a:p>
+            <a:r>
+              <a:rPr lang="fr-FR" sz="1400" dirty="0"/>
+              <a:t>Partition</a:t>
+            </a:r>
+            <a:endParaRPr lang="fr-FR" sz="2000" dirty="0"/>
+          </a:p>
+        </p:txBody>
+      </p:sp>
+      <p:cxnSp>
+        <p:nvCxnSpPr>
+          <p:cNvPr id="313" name="Connecteur droit avec flèche 312">
+            <a:extLst>
+              <a:ext uri="{FF2B5EF4-FFF2-40B4-BE49-F238E27FC236}">
+                <a16:creationId xmlns:a16="http://schemas.microsoft.com/office/drawing/2014/main" id="{B101809C-20E1-40CF-AC0D-472C660390D6}"/>
+              </a:ext>
+            </a:extLst>
+          </p:cNvPr>
+          <p:cNvCxnSpPr>
+            <a:cxnSpLocks/>
+          </p:cNvCxnSpPr>
+          <p:nvPr/>
+        </p:nvCxnSpPr>
+        <p:spPr>
+          <a:xfrm>
+            <a:off x="6736733" y="2299441"/>
+            <a:ext cx="0" cy="352869"/>
+          </a:xfrm>
+          <a:prstGeom prst="straightConnector1">
+            <a:avLst/>
+          </a:prstGeom>
+          <a:ln>
+            <a:tailEnd type="triangle"/>
+          </a:ln>
+        </p:spPr>
+        <p:style>
+          <a:lnRef idx="3">
+            <a:schemeClr val="accent6"/>
+          </a:lnRef>
+          <a:fillRef idx="0">
+            <a:schemeClr val="accent6"/>
+          </a:fillRef>
+          <a:effectRef idx="2">
+            <a:schemeClr val="accent6"/>
+          </a:effectRef>
+          <a:fontRef idx="minor">
+            <a:schemeClr val="tx1"/>
+          </a:fontRef>
+        </p:style>
+      </p:cxnSp>
+      <p:cxnSp>
+        <p:nvCxnSpPr>
+          <p:cNvPr id="314" name="Connecteur droit avec flèche 313">
+            <a:extLst>
+              <a:ext uri="{FF2B5EF4-FFF2-40B4-BE49-F238E27FC236}">
+                <a16:creationId xmlns:a16="http://schemas.microsoft.com/office/drawing/2014/main" id="{CA91BE4B-A161-47F3-8B84-B21D975432FE}"/>
+              </a:ext>
+            </a:extLst>
+          </p:cNvPr>
+          <p:cNvCxnSpPr>
+            <a:cxnSpLocks/>
+          </p:cNvCxnSpPr>
+          <p:nvPr/>
+        </p:nvCxnSpPr>
+        <p:spPr>
+          <a:xfrm>
+            <a:off x="6722146" y="2965811"/>
+            <a:ext cx="0" cy="352869"/>
+          </a:xfrm>
+          <a:prstGeom prst="straightConnector1">
+            <a:avLst/>
+          </a:prstGeom>
+          <a:ln>
+            <a:tailEnd type="triangle"/>
+          </a:ln>
+        </p:spPr>
+        <p:style>
+          <a:lnRef idx="3">
+            <a:schemeClr val="accent6"/>
+          </a:lnRef>
+          <a:fillRef idx="0">
+            <a:schemeClr val="accent6"/>
+          </a:fillRef>
+          <a:effectRef idx="2">
+            <a:schemeClr val="accent6"/>
+          </a:effectRef>
+          <a:fontRef idx="minor">
+            <a:schemeClr val="tx1"/>
+          </a:fontRef>
+        </p:style>
+      </p:cxnSp>
+      <p:cxnSp>
+        <p:nvCxnSpPr>
+          <p:cNvPr id="315" name="Connecteur droit avec flèche 314">
+            <a:extLst>
+              <a:ext uri="{FF2B5EF4-FFF2-40B4-BE49-F238E27FC236}">
+                <a16:creationId xmlns:a16="http://schemas.microsoft.com/office/drawing/2014/main" id="{F4DFE365-A8E3-451D-BE04-2FE814379940}"/>
+              </a:ext>
+            </a:extLst>
+          </p:cNvPr>
+          <p:cNvCxnSpPr>
+            <a:cxnSpLocks/>
+          </p:cNvCxnSpPr>
+          <p:nvPr/>
+        </p:nvCxnSpPr>
+        <p:spPr>
+          <a:xfrm>
+            <a:off x="6722146" y="3602986"/>
+            <a:ext cx="0" cy="352869"/>
+          </a:xfrm>
+          <a:prstGeom prst="straightConnector1">
+            <a:avLst/>
+          </a:prstGeom>
+          <a:ln>
+            <a:tailEnd type="triangle"/>
+          </a:ln>
+        </p:spPr>
+        <p:style>
+          <a:lnRef idx="3">
+            <a:schemeClr val="accent6"/>
+          </a:lnRef>
+          <a:fillRef idx="0">
+            <a:schemeClr val="accent6"/>
+          </a:fillRef>
+          <a:effectRef idx="2">
+            <a:schemeClr val="accent6"/>
+          </a:effectRef>
+          <a:fontRef idx="minor">
+            <a:schemeClr val="tx1"/>
+          </a:fontRef>
+        </p:style>
+      </p:cxnSp>
+      <p:sp>
+        <p:nvSpPr>
+          <p:cNvPr id="320" name="ZoneTexte 319">
+            <a:extLst>
+              <a:ext uri="{FF2B5EF4-FFF2-40B4-BE49-F238E27FC236}">
+                <a16:creationId xmlns:a16="http://schemas.microsoft.com/office/drawing/2014/main" id="{1D1AE32A-2D90-4DC6-970F-8C34F899F407}"/>
+              </a:ext>
+            </a:extLst>
+          </p:cNvPr>
+          <p:cNvSpPr txBox="1"/>
+          <p:nvPr/>
+        </p:nvSpPr>
+        <p:spPr>
+          <a:xfrm>
+            <a:off x="6723586" y="2299295"/>
+            <a:ext cx="907596" cy="276999"/>
+          </a:xfrm>
+          <a:prstGeom prst="rect">
+            <a:avLst/>
+          </a:prstGeom>
+          <a:noFill/>
+        </p:spPr>
+        <p:txBody>
+          <a:bodyPr wrap="square" rtlCol="0">
+            <a:spAutoFit/>
+          </a:bodyPr>
+          <a:lstStyle/>
+          <a:p>
+            <a:r>
+              <a:rPr lang="fr-FR" sz="1200" dirty="0">
+                <a:solidFill>
+                  <a:srgbClr val="00B050"/>
+                </a:solidFill>
+              </a:rPr>
+              <a:t>Back.py</a:t>
+            </a:r>
+            <a:endParaRPr lang="fr-FR" dirty="0">
+              <a:solidFill>
+                <a:srgbClr val="00B050"/>
+              </a:solidFill>
+            </a:endParaRPr>
+          </a:p>
+        </p:txBody>
+      </p:sp>
+      <p:sp>
+        <p:nvSpPr>
+          <p:cNvPr id="321" name="ZoneTexte 320">
+            <a:extLst>
+              <a:ext uri="{FF2B5EF4-FFF2-40B4-BE49-F238E27FC236}">
+                <a16:creationId xmlns:a16="http://schemas.microsoft.com/office/drawing/2014/main" id="{7B01932B-2811-4B65-A51B-5CE80FA16AE0}"/>
+              </a:ext>
+            </a:extLst>
+          </p:cNvPr>
+          <p:cNvSpPr txBox="1"/>
+          <p:nvPr/>
+        </p:nvSpPr>
+        <p:spPr>
+          <a:xfrm>
+            <a:off x="6736733" y="2989148"/>
+            <a:ext cx="907596" cy="276999"/>
+          </a:xfrm>
+          <a:prstGeom prst="rect">
+            <a:avLst/>
+          </a:prstGeom>
+          <a:noFill/>
+        </p:spPr>
+        <p:txBody>
+          <a:bodyPr wrap="square" rtlCol="0">
+            <a:spAutoFit/>
+          </a:bodyPr>
+          <a:lstStyle/>
+          <a:p>
+            <a:r>
+              <a:rPr lang="fr-FR" sz="1200" dirty="0" err="1">
+                <a:solidFill>
+                  <a:srgbClr val="00B050"/>
+                </a:solidFill>
+              </a:rPr>
+              <a:t>MIDIFile</a:t>
+            </a:r>
+            <a:endParaRPr lang="fr-FR" dirty="0">
+              <a:solidFill>
+                <a:srgbClr val="00B050"/>
+              </a:solidFill>
+            </a:endParaRPr>
+          </a:p>
+        </p:txBody>
+      </p:sp>
+      <p:sp>
+        <p:nvSpPr>
+          <p:cNvPr id="322" name="ZoneTexte 321">
+            <a:extLst>
+              <a:ext uri="{FF2B5EF4-FFF2-40B4-BE49-F238E27FC236}">
+                <a16:creationId xmlns:a16="http://schemas.microsoft.com/office/drawing/2014/main" id="{6145CE9E-398D-427C-9E76-BDAE8B32D661}"/>
+              </a:ext>
+            </a:extLst>
+          </p:cNvPr>
+          <p:cNvSpPr txBox="1"/>
+          <p:nvPr/>
+        </p:nvSpPr>
+        <p:spPr>
+          <a:xfrm>
+            <a:off x="6736733" y="3619355"/>
+            <a:ext cx="907596" cy="276999"/>
+          </a:xfrm>
+          <a:prstGeom prst="rect">
+            <a:avLst/>
+          </a:prstGeom>
+          <a:noFill/>
+        </p:spPr>
+        <p:txBody>
+          <a:bodyPr wrap="square" rtlCol="0">
+            <a:spAutoFit/>
+          </a:bodyPr>
+          <a:lstStyle/>
+          <a:p>
+            <a:r>
+              <a:rPr lang="fr-FR" sz="1200" dirty="0">
+                <a:solidFill>
+                  <a:srgbClr val="00B050"/>
+                </a:solidFill>
+              </a:rPr>
+              <a:t>Music21</a:t>
+            </a:r>
+            <a:endParaRPr lang="fr-FR" dirty="0">
+              <a:solidFill>
+                <a:srgbClr val="00B050"/>
+              </a:solidFill>
+            </a:endParaRPr>
+          </a:p>
+        </p:txBody>
+      </p:sp>
+    </p:spTree>
+    <p:extLst>
+      <p:ext uri="{BB962C8B-B14F-4D97-AF65-F5344CB8AC3E}">
+        <p14:creationId xmlns:p14="http://schemas.microsoft.com/office/powerpoint/2010/main" val="698212446"/>
+      </p:ext>
+    </p:extLst>
+  </p:cSld>
+  <p:clrMapOvr>
+    <a:masterClrMapping/>
+  </p:clrMapOvr>
+  <p:timing>
+    <p:tnLst>
+      <p:par>
+        <p:cTn id="1" dur="indefinite" restart="never" nodeType="tmRoot">
+          <p:childTnLst>
+            <p:seq concurrent="1" nextAc="seek">
+              <p:cTn id="2" dur="indefinite" nodeType="mainSeq">
+                <p:childTnLst>
+                  <p:par>
+                    <p:cTn id="3" fill="hold">
+                      <p:stCondLst>
+                        <p:cond delay="indefinite"/>
+                      </p:stCondLst>
+                      <p:childTnLst>
+                        <p:par>
+                          <p:cTn id="4" fill="hold">
+                            <p:stCondLst>
+                              <p:cond delay="0"/>
+                            </p:stCondLst>
+                            <p:childTnLst>
+                              <p:par>
+                                <p:cTn id="5" presetID="1" presetClass="entr" presetSubtype="0" fill="hold" grpId="0" nodeType="clickEffect">
+                                  <p:stCondLst>
+                                    <p:cond delay="0"/>
+                                  </p:stCondLst>
+                                  <p:childTnLst>
+                                    <p:set>
+                                      <p:cBhvr>
+                                        <p:cTn id="6" dur="1" fill="hold">
+                                          <p:stCondLst>
+                                            <p:cond delay="0"/>
+                                          </p:stCondLst>
+                                        </p:cTn>
+                                        <p:tgtEl>
+                                          <p:spTgt spid="69"/>
+                                        </p:tgtEl>
+                                        <p:attrNameLst>
+                                          <p:attrName>style.visibility</p:attrName>
+                                        </p:attrNameLst>
+                                      </p:cBhvr>
+                                      <p:to>
+                                        <p:strVal val="visible"/>
+                                      </p:to>
+                                    </p:set>
+                                  </p:childTnLst>
+                                </p:cTn>
+                              </p:par>
+                            </p:childTnLst>
+                          </p:cTn>
+                        </p:par>
+                      </p:childTnLst>
+                    </p:cTn>
+                  </p:par>
+                  <p:par>
+                    <p:cTn id="7" fill="hold">
+                      <p:stCondLst>
+                        <p:cond delay="indefinite"/>
+                      </p:stCondLst>
+                      <p:childTnLst>
+                        <p:par>
+                          <p:cTn id="8" fill="hold">
+                            <p:stCondLst>
+                              <p:cond delay="0"/>
+                            </p:stCondLst>
+                            <p:childTnLst>
+                              <p:par>
+                                <p:cTn id="9" presetID="1" presetClass="entr" presetSubtype="0" fill="hold" grpId="0" nodeType="clickEffect">
+                                  <p:stCondLst>
+                                    <p:cond delay="0"/>
+                                  </p:stCondLst>
+                                  <p:childTnLst>
+                                    <p:set>
+                                      <p:cBhvr>
+                                        <p:cTn id="10" dur="1" fill="hold">
+                                          <p:stCondLst>
+                                            <p:cond delay="0"/>
+                                          </p:stCondLst>
+                                        </p:cTn>
+                                        <p:tgtEl>
+                                          <p:spTgt spid="70"/>
+                                        </p:tgtEl>
+                                        <p:attrNameLst>
+                                          <p:attrName>style.visibility</p:attrName>
+                                        </p:attrNameLst>
+                                      </p:cBhvr>
+                                      <p:to>
+                                        <p:strVal val="visible"/>
+                                      </p:to>
+                                    </p:set>
+                                  </p:childTnLst>
+                                </p:cTn>
+                              </p:par>
+                            </p:childTnLst>
+                          </p:cTn>
+                        </p:par>
+                      </p:childTnLst>
+                    </p:cTn>
+                  </p:par>
+                  <p:par>
+                    <p:cTn id="11" fill="hold">
+                      <p:stCondLst>
+                        <p:cond delay="indefinite"/>
+                      </p:stCondLst>
+                      <p:childTnLst>
+                        <p:par>
+                          <p:cTn id="12" fill="hold">
+                            <p:stCondLst>
+                              <p:cond delay="0"/>
+                            </p:stCondLst>
+                            <p:childTnLst>
+                              <p:par>
+                                <p:cTn id="13" presetID="1" presetClass="entr" presetSubtype="0" fill="hold" grpId="0" nodeType="clickEffect">
+                                  <p:stCondLst>
+                                    <p:cond delay="0"/>
+                                  </p:stCondLst>
+                                  <p:childTnLst>
+                                    <p:set>
+                                      <p:cBhvr>
+                                        <p:cTn id="14" dur="1" fill="hold">
+                                          <p:stCondLst>
+                                            <p:cond delay="0"/>
+                                          </p:stCondLst>
+                                        </p:cTn>
+                                        <p:tgtEl>
+                                          <p:spTgt spid="71"/>
+                                        </p:tgtEl>
+                                        <p:attrNameLst>
+                                          <p:attrName>style.visibility</p:attrName>
+                                        </p:attrNameLst>
+                                      </p:cBhvr>
+                                      <p:to>
+                                        <p:strVal val="visible"/>
+                                      </p:to>
+                                    </p:set>
+                                  </p:childTnLst>
+                                </p:cTn>
+                              </p:par>
+                            </p:childTnLst>
+                          </p:cTn>
+                        </p:par>
+                      </p:childTnLst>
+                    </p:cTn>
+                  </p:par>
+                  <p:par>
+                    <p:cTn id="15" fill="hold">
+                      <p:stCondLst>
+                        <p:cond delay="indefinite"/>
+                      </p:stCondLst>
+                      <p:childTnLst>
+                        <p:par>
+                          <p:cTn id="16" fill="hold">
+                            <p:stCondLst>
+                              <p:cond delay="0"/>
+                            </p:stCondLst>
+                            <p:childTnLst>
+                              <p:par>
+                                <p:cTn id="17" presetID="1" presetClass="entr" presetSubtype="0" fill="hold" grpId="0" nodeType="clickEffect">
+                                  <p:stCondLst>
+                                    <p:cond delay="0"/>
+                                  </p:stCondLst>
+                                  <p:childTnLst>
+                                    <p:set>
+                                      <p:cBhvr>
+                                        <p:cTn id="18" dur="1" fill="hold">
+                                          <p:stCondLst>
+                                            <p:cond delay="0"/>
+                                          </p:stCondLst>
+                                        </p:cTn>
+                                        <p:tgtEl>
+                                          <p:spTgt spid="72"/>
+                                        </p:tgtEl>
+                                        <p:attrNameLst>
+                                          <p:attrName>style.visibility</p:attrName>
+                                        </p:attrNameLst>
+                                      </p:cBhvr>
+                                      <p:to>
+                                        <p:strVal val="visible"/>
+                                      </p:to>
+                                    </p:set>
+                                  </p:childTnLst>
+                                </p:cTn>
+                              </p:par>
+                            </p:childTnLst>
+                          </p:cTn>
+                        </p:par>
+                      </p:childTnLst>
+                    </p:cTn>
+                  </p:par>
+                  <p:par>
+                    <p:cTn id="19" fill="hold">
+                      <p:stCondLst>
+                        <p:cond delay="indefinite"/>
+                      </p:stCondLst>
+                      <p:childTnLst>
+                        <p:par>
+                          <p:cTn id="20" fill="hold">
+                            <p:stCondLst>
+                              <p:cond delay="0"/>
+                            </p:stCondLst>
+                            <p:childTnLst>
+                              <p:par>
+                                <p:cTn id="21" presetID="1" presetClass="entr" presetSubtype="0" fill="hold" grpId="0" nodeType="clickEffect">
+                                  <p:stCondLst>
+                                    <p:cond delay="0"/>
+                                  </p:stCondLst>
+                                  <p:childTnLst>
+                                    <p:set>
+                                      <p:cBhvr>
+                                        <p:cTn id="22" dur="1" fill="hold">
+                                          <p:stCondLst>
+                                            <p:cond delay="0"/>
+                                          </p:stCondLst>
+                                        </p:cTn>
+                                        <p:tgtEl>
+                                          <p:spTgt spid="73"/>
+                                        </p:tgtEl>
+                                        <p:attrNameLst>
+                                          <p:attrName>style.visibility</p:attrName>
+                                        </p:attrNameLst>
+                                      </p:cBhvr>
+                                      <p:to>
+                                        <p:strVal val="visible"/>
+                                      </p:to>
+                                    </p:set>
+                                  </p:childTnLst>
+                                </p:cTn>
+                              </p:par>
+                            </p:childTnLst>
+                          </p:cTn>
+                        </p:par>
+                      </p:childTnLst>
+                    </p:cTn>
+                  </p:par>
+                  <p:par>
+                    <p:cTn id="23" fill="hold">
+                      <p:stCondLst>
+                        <p:cond delay="indefinite"/>
+                      </p:stCondLst>
+                      <p:childTnLst>
+                        <p:par>
+                          <p:cTn id="24" fill="hold">
+                            <p:stCondLst>
+                              <p:cond delay="0"/>
+                            </p:stCondLst>
+                            <p:childTnLst>
+                              <p:par>
+                                <p:cTn id="25" presetID="1" presetClass="entr" presetSubtype="0" fill="hold" grpId="0" nodeType="clickEffect">
+                                  <p:stCondLst>
+                                    <p:cond delay="0"/>
+                                  </p:stCondLst>
+                                  <p:childTnLst>
+                                    <p:set>
+                                      <p:cBhvr>
+                                        <p:cTn id="26" dur="1" fill="hold">
+                                          <p:stCondLst>
+                                            <p:cond delay="0"/>
+                                          </p:stCondLst>
+                                        </p:cTn>
+                                        <p:tgtEl>
+                                          <p:spTgt spid="74"/>
+                                        </p:tgtEl>
+                                        <p:attrNameLst>
+                                          <p:attrName>style.visibility</p:attrName>
+                                        </p:attrNameLst>
+                                      </p:cBhvr>
+                                      <p:to>
+                                        <p:strVal val="visible"/>
+                                      </p:to>
+                                    </p:set>
+                                  </p:childTnLst>
+                                </p:cTn>
+                              </p:par>
+                            </p:childTnLst>
+                          </p:cTn>
+                        </p:par>
+                      </p:childTnLst>
+                    </p:cTn>
+                  </p:par>
+                  <p:par>
+                    <p:cTn id="27" fill="hold">
+                      <p:stCondLst>
+                        <p:cond delay="indefinite"/>
+                      </p:stCondLst>
+                      <p:childTnLst>
+                        <p:par>
+                          <p:cTn id="28" fill="hold">
+                            <p:stCondLst>
+                              <p:cond delay="0"/>
+                            </p:stCondLst>
+                            <p:childTnLst>
+                              <p:par>
+                                <p:cTn id="29" presetID="1" presetClass="entr" presetSubtype="0" fill="hold" nodeType="clickEffect">
+                                  <p:stCondLst>
+                                    <p:cond delay="0"/>
+                                  </p:stCondLst>
+                                  <p:childTnLst>
+                                    <p:set>
+                                      <p:cBhvr>
+                                        <p:cTn id="30" dur="1" fill="hold">
+                                          <p:stCondLst>
+                                            <p:cond delay="0"/>
+                                          </p:stCondLst>
+                                        </p:cTn>
+                                        <p:tgtEl>
+                                          <p:spTgt spid="186"/>
+                                        </p:tgtEl>
+                                        <p:attrNameLst>
+                                          <p:attrName>style.visibility</p:attrName>
+                                        </p:attrNameLst>
+                                      </p:cBhvr>
+                                      <p:to>
+                                        <p:strVal val="visible"/>
+                                      </p:to>
+                                    </p:set>
+                                  </p:childTnLst>
+                                </p:cTn>
+                              </p:par>
+                            </p:childTnLst>
+                          </p:cTn>
+                        </p:par>
+                      </p:childTnLst>
+                    </p:cTn>
+                  </p:par>
+                  <p:par>
+                    <p:cTn id="31" fill="hold">
+                      <p:stCondLst>
+                        <p:cond delay="indefinite"/>
+                      </p:stCondLst>
+                      <p:childTnLst>
+                        <p:par>
+                          <p:cTn id="32" fill="hold">
+                            <p:stCondLst>
+                              <p:cond delay="0"/>
+                            </p:stCondLst>
+                            <p:childTnLst>
+                              <p:par>
+                                <p:cTn id="33" presetID="1" presetClass="entr" presetSubtype="0" fill="hold" nodeType="clickEffect">
+                                  <p:stCondLst>
+                                    <p:cond delay="0"/>
+                                  </p:stCondLst>
+                                  <p:childTnLst>
+                                    <p:set>
+                                      <p:cBhvr>
+                                        <p:cTn id="34" dur="1" fill="hold">
+                                          <p:stCondLst>
+                                            <p:cond delay="0"/>
+                                          </p:stCondLst>
+                                        </p:cTn>
+                                        <p:tgtEl>
+                                          <p:spTgt spid="189"/>
+                                        </p:tgtEl>
+                                        <p:attrNameLst>
+                                          <p:attrName>style.visibility</p:attrName>
+                                        </p:attrNameLst>
+                                      </p:cBhvr>
+                                      <p:to>
+                                        <p:strVal val="visible"/>
+                                      </p:to>
+                                    </p:set>
+                                  </p:childTnLst>
+                                </p:cTn>
+                              </p:par>
+                            </p:childTnLst>
+                          </p:cTn>
+                        </p:par>
+                      </p:childTnLst>
+                    </p:cTn>
+                  </p:par>
+                  <p:par>
+                    <p:cTn id="35" fill="hold">
+                      <p:stCondLst>
+                        <p:cond delay="indefinite"/>
+                      </p:stCondLst>
+                      <p:childTnLst>
+                        <p:par>
+                          <p:cTn id="36" fill="hold">
+                            <p:stCondLst>
+                              <p:cond delay="0"/>
+                            </p:stCondLst>
+                            <p:childTnLst>
+                              <p:par>
+                                <p:cTn id="37" presetID="1" presetClass="entr" presetSubtype="0" fill="hold" nodeType="clickEffect">
+                                  <p:stCondLst>
+                                    <p:cond delay="0"/>
+                                  </p:stCondLst>
+                                  <p:childTnLst>
+                                    <p:set>
+                                      <p:cBhvr>
+                                        <p:cTn id="38" dur="1" fill="hold">
+                                          <p:stCondLst>
+                                            <p:cond delay="0"/>
+                                          </p:stCondLst>
+                                        </p:cTn>
+                                        <p:tgtEl>
+                                          <p:spTgt spid="190"/>
+                                        </p:tgtEl>
+                                        <p:attrNameLst>
+                                          <p:attrName>style.visibility</p:attrName>
+                                        </p:attrNameLst>
+                                      </p:cBhvr>
+                                      <p:to>
+                                        <p:strVal val="visible"/>
+                                      </p:to>
+                                    </p:set>
+                                  </p:childTnLst>
+                                </p:cTn>
+                              </p:par>
+                            </p:childTnLst>
+                          </p:cTn>
+                        </p:par>
+                      </p:childTnLst>
+                    </p:cTn>
+                  </p:par>
+                  <p:par>
+                    <p:cTn id="39" fill="hold">
+                      <p:stCondLst>
+                        <p:cond delay="indefinite"/>
+                      </p:stCondLst>
+                      <p:childTnLst>
+                        <p:par>
+                          <p:cTn id="40" fill="hold">
+                            <p:stCondLst>
+                              <p:cond delay="0"/>
+                            </p:stCondLst>
+                            <p:childTnLst>
+                              <p:par>
+                                <p:cTn id="41" presetID="1" presetClass="entr" presetSubtype="0" fill="hold" grpId="0" nodeType="clickEffect">
+                                  <p:stCondLst>
+                                    <p:cond delay="0"/>
+                                  </p:stCondLst>
+                                  <p:childTnLst>
+                                    <p:set>
+                                      <p:cBhvr>
+                                        <p:cTn id="42" dur="1" fill="hold">
+                                          <p:stCondLst>
+                                            <p:cond delay="0"/>
+                                          </p:stCondLst>
+                                        </p:cTn>
+                                        <p:tgtEl>
+                                          <p:spTgt spid="195"/>
+                                        </p:tgtEl>
+                                        <p:attrNameLst>
+                                          <p:attrName>style.visibility</p:attrName>
+                                        </p:attrNameLst>
+                                      </p:cBhvr>
+                                      <p:to>
+                                        <p:strVal val="visible"/>
+                                      </p:to>
+                                    </p:set>
+                                  </p:childTnLst>
+                                </p:cTn>
+                              </p:par>
+                            </p:childTnLst>
+                          </p:cTn>
+                        </p:par>
+                      </p:childTnLst>
+                    </p:cTn>
+                  </p:par>
+                  <p:par>
+                    <p:cTn id="43" fill="hold">
+                      <p:stCondLst>
+                        <p:cond delay="indefinite"/>
+                      </p:stCondLst>
+                      <p:childTnLst>
+                        <p:par>
+                          <p:cTn id="44" fill="hold">
+                            <p:stCondLst>
+                              <p:cond delay="0"/>
+                            </p:stCondLst>
+                            <p:childTnLst>
+                              <p:par>
+                                <p:cTn id="45" presetID="1" presetClass="entr" presetSubtype="0" fill="hold" grpId="0" nodeType="clickEffect">
+                                  <p:stCondLst>
+                                    <p:cond delay="0"/>
+                                  </p:stCondLst>
+                                  <p:childTnLst>
+                                    <p:set>
+                                      <p:cBhvr>
+                                        <p:cTn id="46" dur="1" fill="hold">
+                                          <p:stCondLst>
+                                            <p:cond delay="0"/>
+                                          </p:stCondLst>
+                                        </p:cTn>
+                                        <p:tgtEl>
+                                          <p:spTgt spid="196"/>
+                                        </p:tgtEl>
+                                        <p:attrNameLst>
+                                          <p:attrName>style.visibility</p:attrName>
+                                        </p:attrNameLst>
+                                      </p:cBhvr>
+                                      <p:to>
+                                        <p:strVal val="visible"/>
+                                      </p:to>
+                                    </p:set>
+                                  </p:childTnLst>
+                                </p:cTn>
+                              </p:par>
+                            </p:childTnLst>
+                          </p:cTn>
+                        </p:par>
+                      </p:childTnLst>
+                    </p:cTn>
+                  </p:par>
+                  <p:par>
+                    <p:cTn id="47" fill="hold">
+                      <p:stCondLst>
+                        <p:cond delay="indefinite"/>
+                      </p:stCondLst>
+                      <p:childTnLst>
+                        <p:par>
+                          <p:cTn id="48" fill="hold">
+                            <p:stCondLst>
+                              <p:cond delay="0"/>
+                            </p:stCondLst>
+                            <p:childTnLst>
+                              <p:par>
+                                <p:cTn id="49" presetID="1" presetClass="entr" presetSubtype="0" fill="hold" nodeType="clickEffect">
+                                  <p:stCondLst>
+                                    <p:cond delay="0"/>
+                                  </p:stCondLst>
+                                  <p:childTnLst>
+                                    <p:set>
+                                      <p:cBhvr>
+                                        <p:cTn id="50" dur="1" fill="hold">
+                                          <p:stCondLst>
+                                            <p:cond delay="0"/>
+                                          </p:stCondLst>
+                                        </p:cTn>
+                                        <p:tgtEl>
+                                          <p:spTgt spid="197"/>
+                                        </p:tgtEl>
+                                        <p:attrNameLst>
+                                          <p:attrName>style.visibility</p:attrName>
+                                        </p:attrNameLst>
+                                      </p:cBhvr>
+                                      <p:to>
+                                        <p:strVal val="visible"/>
+                                      </p:to>
+                                    </p:set>
+                                  </p:childTnLst>
+                                </p:cTn>
+                              </p:par>
+                            </p:childTnLst>
+                          </p:cTn>
+                        </p:par>
+                      </p:childTnLst>
+                    </p:cTn>
+                  </p:par>
+                  <p:par>
+                    <p:cTn id="51" fill="hold">
+                      <p:stCondLst>
+                        <p:cond delay="indefinite"/>
+                      </p:stCondLst>
+                      <p:childTnLst>
+                        <p:par>
+                          <p:cTn id="52" fill="hold">
+                            <p:stCondLst>
+                              <p:cond delay="0"/>
+                            </p:stCondLst>
+                            <p:childTnLst>
+                              <p:par>
+                                <p:cTn id="53" presetID="1" presetClass="entr" presetSubtype="0" fill="hold" grpId="0" nodeType="clickEffect">
+                                  <p:stCondLst>
+                                    <p:cond delay="0"/>
+                                  </p:stCondLst>
+                                  <p:childTnLst>
+                                    <p:set>
+                                      <p:cBhvr>
+                                        <p:cTn id="54" dur="1" fill="hold">
+                                          <p:stCondLst>
+                                            <p:cond delay="0"/>
+                                          </p:stCondLst>
+                                        </p:cTn>
+                                        <p:tgtEl>
+                                          <p:spTgt spid="198"/>
+                                        </p:tgtEl>
+                                        <p:attrNameLst>
+                                          <p:attrName>style.visibility</p:attrName>
+                                        </p:attrNameLst>
+                                      </p:cBhvr>
+                                      <p:to>
+                                        <p:strVal val="visible"/>
+                                      </p:to>
+                                    </p:set>
+                                  </p:childTnLst>
+                                </p:cTn>
+                              </p:par>
+                            </p:childTnLst>
+                          </p:cTn>
+                        </p:par>
+                      </p:childTnLst>
+                    </p:cTn>
+                  </p:par>
+                  <p:par>
+                    <p:cTn id="55" fill="hold">
+                      <p:stCondLst>
+                        <p:cond delay="indefinite"/>
+                      </p:stCondLst>
+                      <p:childTnLst>
+                        <p:par>
+                          <p:cTn id="56" fill="hold">
+                            <p:stCondLst>
+                              <p:cond delay="0"/>
+                            </p:stCondLst>
+                            <p:childTnLst>
+                              <p:par>
+                                <p:cTn id="57" presetID="1" presetClass="entr" presetSubtype="0" fill="hold" grpId="0" nodeType="clickEffect">
+                                  <p:stCondLst>
+                                    <p:cond delay="0"/>
+                                  </p:stCondLst>
+                                  <p:childTnLst>
+                                    <p:set>
+                                      <p:cBhvr>
+                                        <p:cTn id="58" dur="1" fill="hold">
+                                          <p:stCondLst>
+                                            <p:cond delay="0"/>
+                                          </p:stCondLst>
+                                        </p:cTn>
+                                        <p:tgtEl>
+                                          <p:spTgt spid="199"/>
+                                        </p:tgtEl>
+                                        <p:attrNameLst>
+                                          <p:attrName>style.visibility</p:attrName>
+                                        </p:attrNameLst>
+                                      </p:cBhvr>
+                                      <p:to>
+                                        <p:strVal val="visible"/>
+                                      </p:to>
+                                    </p:set>
+                                  </p:childTnLst>
+                                </p:cTn>
+                              </p:par>
+                            </p:childTnLst>
+                          </p:cTn>
+                        </p:par>
+                      </p:childTnLst>
+                    </p:cTn>
+                  </p:par>
+                  <p:par>
+                    <p:cTn id="59" fill="hold">
+                      <p:stCondLst>
+                        <p:cond delay="indefinite"/>
+                      </p:stCondLst>
+                      <p:childTnLst>
+                        <p:par>
+                          <p:cTn id="60" fill="hold">
+                            <p:stCondLst>
+                              <p:cond delay="0"/>
+                            </p:stCondLst>
+                            <p:childTnLst>
+                              <p:par>
+                                <p:cTn id="61" presetID="1" presetClass="entr" presetSubtype="0" fill="hold" grpId="0" nodeType="clickEffect">
+                                  <p:stCondLst>
+                                    <p:cond delay="0"/>
+                                  </p:stCondLst>
+                                  <p:childTnLst>
+                                    <p:set>
+                                      <p:cBhvr>
+                                        <p:cTn id="62" dur="1" fill="hold">
+                                          <p:stCondLst>
+                                            <p:cond delay="0"/>
+                                          </p:stCondLst>
+                                        </p:cTn>
+                                        <p:tgtEl>
+                                          <p:spTgt spid="200"/>
+                                        </p:tgtEl>
+                                        <p:attrNameLst>
+                                          <p:attrName>style.visibility</p:attrName>
+                                        </p:attrNameLst>
+                                      </p:cBhvr>
+                                      <p:to>
+                                        <p:strVal val="visible"/>
+                                      </p:to>
+                                    </p:set>
+                                  </p:childTnLst>
+                                </p:cTn>
+                              </p:par>
+                            </p:childTnLst>
+                          </p:cTn>
+                        </p:par>
+                      </p:childTnLst>
+                    </p:cTn>
+                  </p:par>
+                  <p:par>
+                    <p:cTn id="63" fill="hold">
+                      <p:stCondLst>
+                        <p:cond delay="indefinite"/>
+                      </p:stCondLst>
+                      <p:childTnLst>
+                        <p:par>
+                          <p:cTn id="64" fill="hold">
+                            <p:stCondLst>
+                              <p:cond delay="0"/>
+                            </p:stCondLst>
+                            <p:childTnLst>
+                              <p:par>
+                                <p:cTn id="65" presetID="1" presetClass="entr" presetSubtype="0" fill="hold" nodeType="clickEffect">
+                                  <p:stCondLst>
+                                    <p:cond delay="0"/>
+                                  </p:stCondLst>
+                                  <p:childTnLst>
+                                    <p:set>
+                                      <p:cBhvr>
+                                        <p:cTn id="66" dur="1" fill="hold">
+                                          <p:stCondLst>
+                                            <p:cond delay="0"/>
+                                          </p:stCondLst>
+                                        </p:cTn>
+                                        <p:tgtEl>
+                                          <p:spTgt spid="201"/>
+                                        </p:tgtEl>
+                                        <p:attrNameLst>
+                                          <p:attrName>style.visibility</p:attrName>
+                                        </p:attrNameLst>
+                                      </p:cBhvr>
+                                      <p:to>
+                                        <p:strVal val="visible"/>
+                                      </p:to>
+                                    </p:set>
+                                  </p:childTnLst>
+                                </p:cTn>
+                              </p:par>
+                            </p:childTnLst>
+                          </p:cTn>
+                        </p:par>
+                      </p:childTnLst>
+                    </p:cTn>
+                  </p:par>
+                  <p:par>
+                    <p:cTn id="67" fill="hold">
+                      <p:stCondLst>
+                        <p:cond delay="indefinite"/>
+                      </p:stCondLst>
+                      <p:childTnLst>
+                        <p:par>
+                          <p:cTn id="68" fill="hold">
+                            <p:stCondLst>
+                              <p:cond delay="0"/>
+                            </p:stCondLst>
+                            <p:childTnLst>
+                              <p:par>
+                                <p:cTn id="69" presetID="1" presetClass="entr" presetSubtype="0" fill="hold" nodeType="clickEffect">
+                                  <p:stCondLst>
+                                    <p:cond delay="0"/>
+                                  </p:stCondLst>
+                                  <p:childTnLst>
+                                    <p:set>
+                                      <p:cBhvr>
+                                        <p:cTn id="70" dur="1" fill="hold">
+                                          <p:stCondLst>
+                                            <p:cond delay="0"/>
+                                          </p:stCondLst>
+                                        </p:cTn>
+                                        <p:tgtEl>
+                                          <p:spTgt spid="205"/>
+                                        </p:tgtEl>
+                                        <p:attrNameLst>
+                                          <p:attrName>style.visibility</p:attrName>
+                                        </p:attrNameLst>
+                                      </p:cBhvr>
+                                      <p:to>
+                                        <p:strVal val="visible"/>
+                                      </p:to>
+                                    </p:set>
+                                  </p:childTnLst>
+                                </p:cTn>
+                              </p:par>
+                              <p:par>
+                                <p:cTn id="71" presetID="1" presetClass="entr" presetSubtype="0" fill="hold" nodeType="withEffect">
+                                  <p:stCondLst>
+                                    <p:cond delay="0"/>
+                                  </p:stCondLst>
+                                  <p:childTnLst>
+                                    <p:set>
+                                      <p:cBhvr>
+                                        <p:cTn id="72" dur="1" fill="hold">
+                                          <p:stCondLst>
+                                            <p:cond delay="0"/>
+                                          </p:stCondLst>
+                                        </p:cTn>
+                                        <p:tgtEl>
+                                          <p:spTgt spid="210"/>
+                                        </p:tgtEl>
+                                        <p:attrNameLst>
+                                          <p:attrName>style.visibility</p:attrName>
+                                        </p:attrNameLst>
+                                      </p:cBhvr>
+                                      <p:to>
+                                        <p:strVal val="visible"/>
+                                      </p:to>
+                                    </p:set>
+                                  </p:childTnLst>
+                                </p:cTn>
+                              </p:par>
+                            </p:childTnLst>
+                          </p:cTn>
+                        </p:par>
+                      </p:childTnLst>
+                    </p:cTn>
+                  </p:par>
+                  <p:par>
+                    <p:cTn id="73" fill="hold">
+                      <p:stCondLst>
+                        <p:cond delay="indefinite"/>
+                      </p:stCondLst>
+                      <p:childTnLst>
+                        <p:par>
+                          <p:cTn id="74" fill="hold">
+                            <p:stCondLst>
+                              <p:cond delay="0"/>
+                            </p:stCondLst>
+                            <p:childTnLst>
+                              <p:par>
+                                <p:cTn id="75" presetID="1" presetClass="entr" presetSubtype="0" fill="hold" grpId="0" nodeType="clickEffect">
+                                  <p:stCondLst>
+                                    <p:cond delay="0"/>
+                                  </p:stCondLst>
+                                  <p:childTnLst>
+                                    <p:set>
+                                      <p:cBhvr>
+                                        <p:cTn id="76" dur="1" fill="hold">
+                                          <p:stCondLst>
+                                            <p:cond delay="0"/>
+                                          </p:stCondLst>
+                                        </p:cTn>
+                                        <p:tgtEl>
+                                          <p:spTgt spid="267"/>
+                                        </p:tgtEl>
+                                        <p:attrNameLst>
+                                          <p:attrName>style.visibility</p:attrName>
+                                        </p:attrNameLst>
+                                      </p:cBhvr>
+                                      <p:to>
+                                        <p:strVal val="visible"/>
+                                      </p:to>
+                                    </p:set>
+                                  </p:childTnLst>
+                                </p:cTn>
+                              </p:par>
+                            </p:childTnLst>
+                          </p:cTn>
+                        </p:par>
+                      </p:childTnLst>
+                    </p:cTn>
+                  </p:par>
+                  <p:par>
+                    <p:cTn id="77" fill="hold">
+                      <p:stCondLst>
+                        <p:cond delay="indefinite"/>
+                      </p:stCondLst>
+                      <p:childTnLst>
+                        <p:par>
+                          <p:cTn id="78" fill="hold">
+                            <p:stCondLst>
+                              <p:cond delay="0"/>
+                            </p:stCondLst>
+                            <p:childTnLst>
+                              <p:par>
+                                <p:cTn id="79" presetID="1" presetClass="entr" presetSubtype="0" fill="hold" nodeType="clickEffect">
+                                  <p:stCondLst>
+                                    <p:cond delay="0"/>
+                                  </p:stCondLst>
+                                  <p:childTnLst>
+                                    <p:set>
+                                      <p:cBhvr>
+                                        <p:cTn id="80" dur="1" fill="hold">
+                                          <p:stCondLst>
+                                            <p:cond delay="0"/>
+                                          </p:stCondLst>
+                                        </p:cTn>
+                                        <p:tgtEl>
+                                          <p:spTgt spid="268"/>
+                                        </p:tgtEl>
+                                        <p:attrNameLst>
+                                          <p:attrName>style.visibility</p:attrName>
+                                        </p:attrNameLst>
+                                      </p:cBhvr>
+                                      <p:to>
+                                        <p:strVal val="visible"/>
+                                      </p:to>
+                                    </p:set>
+                                  </p:childTnLst>
+                                </p:cTn>
+                              </p:par>
+                            </p:childTnLst>
+                          </p:cTn>
+                        </p:par>
+                      </p:childTnLst>
+                    </p:cTn>
+                  </p:par>
+                  <p:par>
+                    <p:cTn id="81" fill="hold">
+                      <p:stCondLst>
+                        <p:cond delay="indefinite"/>
+                      </p:stCondLst>
+                      <p:childTnLst>
+                        <p:par>
+                          <p:cTn id="82" fill="hold">
+                            <p:stCondLst>
+                              <p:cond delay="0"/>
+                            </p:stCondLst>
+                            <p:childTnLst>
+                              <p:par>
+                                <p:cTn id="83" presetID="1" presetClass="entr" presetSubtype="0" fill="hold" nodeType="clickEffect">
+                                  <p:stCondLst>
+                                    <p:cond delay="0"/>
+                                  </p:stCondLst>
+                                  <p:childTnLst>
+                                    <p:set>
+                                      <p:cBhvr>
+                                        <p:cTn id="84" dur="1" fill="hold">
+                                          <p:stCondLst>
+                                            <p:cond delay="0"/>
+                                          </p:stCondLst>
+                                        </p:cTn>
+                                        <p:tgtEl>
+                                          <p:spTgt spid="269"/>
+                                        </p:tgtEl>
+                                        <p:attrNameLst>
+                                          <p:attrName>style.visibility</p:attrName>
+                                        </p:attrNameLst>
+                                      </p:cBhvr>
+                                      <p:to>
+                                        <p:strVal val="visible"/>
+                                      </p:to>
+                                    </p:set>
+                                  </p:childTnLst>
+                                </p:cTn>
+                              </p:par>
+                            </p:childTnLst>
+                          </p:cTn>
+                        </p:par>
+                      </p:childTnLst>
+                    </p:cTn>
+                  </p:par>
+                  <p:par>
+                    <p:cTn id="85" fill="hold">
+                      <p:stCondLst>
+                        <p:cond delay="indefinite"/>
+                      </p:stCondLst>
+                      <p:childTnLst>
+                        <p:par>
+                          <p:cTn id="86" fill="hold">
+                            <p:stCondLst>
+                              <p:cond delay="0"/>
+                            </p:stCondLst>
+                            <p:childTnLst>
+                              <p:par>
+                                <p:cTn id="87" presetID="1" presetClass="entr" presetSubtype="0" fill="hold" nodeType="clickEffect">
+                                  <p:stCondLst>
+                                    <p:cond delay="0"/>
+                                  </p:stCondLst>
+                                  <p:childTnLst>
+                                    <p:set>
+                                      <p:cBhvr>
+                                        <p:cTn id="88" dur="1" fill="hold">
+                                          <p:stCondLst>
+                                            <p:cond delay="0"/>
+                                          </p:stCondLst>
+                                        </p:cTn>
+                                        <p:tgtEl>
+                                          <p:spTgt spid="270"/>
+                                        </p:tgtEl>
+                                        <p:attrNameLst>
+                                          <p:attrName>style.visibility</p:attrName>
+                                        </p:attrNameLst>
+                                      </p:cBhvr>
+                                      <p:to>
+                                        <p:strVal val="visible"/>
+                                      </p:to>
+                                    </p:set>
+                                  </p:childTnLst>
+                                </p:cTn>
+                              </p:par>
+                            </p:childTnLst>
+                          </p:cTn>
+                        </p:par>
+                      </p:childTnLst>
+                    </p:cTn>
+                  </p:par>
+                  <p:par>
+                    <p:cTn id="89" fill="hold">
+                      <p:stCondLst>
+                        <p:cond delay="indefinite"/>
+                      </p:stCondLst>
+                      <p:childTnLst>
+                        <p:par>
+                          <p:cTn id="90" fill="hold">
+                            <p:stCondLst>
+                              <p:cond delay="0"/>
+                            </p:stCondLst>
+                            <p:childTnLst>
+                              <p:par>
+                                <p:cTn id="91" presetID="1" presetClass="entr" presetSubtype="0" fill="hold" grpId="0" nodeType="clickEffect">
+                                  <p:stCondLst>
+                                    <p:cond delay="0"/>
+                                  </p:stCondLst>
+                                  <p:childTnLst>
+                                    <p:set>
+                                      <p:cBhvr>
+                                        <p:cTn id="92" dur="1" fill="hold">
+                                          <p:stCondLst>
+                                            <p:cond delay="0"/>
+                                          </p:stCondLst>
+                                        </p:cTn>
+                                        <p:tgtEl>
+                                          <p:spTgt spid="271"/>
+                                        </p:tgtEl>
+                                        <p:attrNameLst>
+                                          <p:attrName>style.visibility</p:attrName>
+                                        </p:attrNameLst>
+                                      </p:cBhvr>
+                                      <p:to>
+                                        <p:strVal val="visible"/>
+                                      </p:to>
+                                    </p:set>
+                                  </p:childTnLst>
+                                </p:cTn>
+                              </p:par>
+                            </p:childTnLst>
+                          </p:cTn>
+                        </p:par>
+                      </p:childTnLst>
+                    </p:cTn>
+                  </p:par>
+                  <p:par>
+                    <p:cTn id="93" fill="hold">
+                      <p:stCondLst>
+                        <p:cond delay="indefinite"/>
+                      </p:stCondLst>
+                      <p:childTnLst>
+                        <p:par>
+                          <p:cTn id="94" fill="hold">
+                            <p:stCondLst>
+                              <p:cond delay="0"/>
+                            </p:stCondLst>
+                            <p:childTnLst>
+                              <p:par>
+                                <p:cTn id="95" presetID="1" presetClass="entr" presetSubtype="0" fill="hold" grpId="0" nodeType="clickEffect">
+                                  <p:stCondLst>
+                                    <p:cond delay="0"/>
+                                  </p:stCondLst>
+                                  <p:childTnLst>
+                                    <p:set>
+                                      <p:cBhvr>
+                                        <p:cTn id="96" dur="1" fill="hold">
+                                          <p:stCondLst>
+                                            <p:cond delay="0"/>
+                                          </p:stCondLst>
+                                        </p:cTn>
+                                        <p:tgtEl>
+                                          <p:spTgt spid="272"/>
+                                        </p:tgtEl>
+                                        <p:attrNameLst>
+                                          <p:attrName>style.visibility</p:attrName>
+                                        </p:attrNameLst>
+                                      </p:cBhvr>
+                                      <p:to>
+                                        <p:strVal val="visible"/>
+                                      </p:to>
+                                    </p:set>
+                                  </p:childTnLst>
+                                </p:cTn>
+                              </p:par>
+                            </p:childTnLst>
+                          </p:cTn>
+                        </p:par>
+                      </p:childTnLst>
+                    </p:cTn>
+                  </p:par>
+                  <p:par>
+                    <p:cTn id="97" fill="hold">
+                      <p:stCondLst>
+                        <p:cond delay="indefinite"/>
+                      </p:stCondLst>
+                      <p:childTnLst>
+                        <p:par>
+                          <p:cTn id="98" fill="hold">
+                            <p:stCondLst>
+                              <p:cond delay="0"/>
+                            </p:stCondLst>
+                            <p:childTnLst>
+                              <p:par>
+                                <p:cTn id="99" presetID="1" presetClass="entr" presetSubtype="0" fill="hold" nodeType="clickEffect">
+                                  <p:stCondLst>
+                                    <p:cond delay="0"/>
+                                  </p:stCondLst>
+                                  <p:childTnLst>
+                                    <p:set>
+                                      <p:cBhvr>
+                                        <p:cTn id="100" dur="1" fill="hold">
+                                          <p:stCondLst>
+                                            <p:cond delay="0"/>
+                                          </p:stCondLst>
+                                        </p:cTn>
+                                        <p:tgtEl>
+                                          <p:spTgt spid="273"/>
+                                        </p:tgtEl>
+                                        <p:attrNameLst>
+                                          <p:attrName>style.visibility</p:attrName>
+                                        </p:attrNameLst>
+                                      </p:cBhvr>
+                                      <p:to>
+                                        <p:strVal val="visible"/>
+                                      </p:to>
+                                    </p:set>
+                                  </p:childTnLst>
+                                </p:cTn>
+                              </p:par>
+                            </p:childTnLst>
+                          </p:cTn>
+                        </p:par>
+                      </p:childTnLst>
+                    </p:cTn>
+                  </p:par>
+                  <p:par>
+                    <p:cTn id="101" fill="hold">
+                      <p:stCondLst>
+                        <p:cond delay="indefinite"/>
+                      </p:stCondLst>
+                      <p:childTnLst>
+                        <p:par>
+                          <p:cTn id="102" fill="hold">
+                            <p:stCondLst>
+                              <p:cond delay="0"/>
+                            </p:stCondLst>
+                            <p:childTnLst>
+                              <p:par>
+                                <p:cTn id="103" presetID="1" presetClass="entr" presetSubtype="0" fill="hold" grpId="0" nodeType="clickEffect">
+                                  <p:stCondLst>
+                                    <p:cond delay="0"/>
+                                  </p:stCondLst>
+                                  <p:childTnLst>
+                                    <p:set>
+                                      <p:cBhvr>
+                                        <p:cTn id="104" dur="1" fill="hold">
+                                          <p:stCondLst>
+                                            <p:cond delay="0"/>
+                                          </p:stCondLst>
+                                        </p:cTn>
+                                        <p:tgtEl>
+                                          <p:spTgt spid="274"/>
+                                        </p:tgtEl>
+                                        <p:attrNameLst>
+                                          <p:attrName>style.visibility</p:attrName>
+                                        </p:attrNameLst>
+                                      </p:cBhvr>
+                                      <p:to>
+                                        <p:strVal val="visible"/>
+                                      </p:to>
+                                    </p:set>
+                                  </p:childTnLst>
+                                </p:cTn>
+                              </p:par>
+                            </p:childTnLst>
+                          </p:cTn>
+                        </p:par>
+                      </p:childTnLst>
+                    </p:cTn>
+                  </p:par>
+                  <p:par>
+                    <p:cTn id="105" fill="hold">
+                      <p:stCondLst>
+                        <p:cond delay="indefinite"/>
+                      </p:stCondLst>
+                      <p:childTnLst>
+                        <p:par>
+                          <p:cTn id="106" fill="hold">
+                            <p:stCondLst>
+                              <p:cond delay="0"/>
+                            </p:stCondLst>
+                            <p:childTnLst>
+                              <p:par>
+                                <p:cTn id="107" presetID="1" presetClass="entr" presetSubtype="0" fill="hold" grpId="0" nodeType="clickEffect">
+                                  <p:stCondLst>
+                                    <p:cond delay="0"/>
+                                  </p:stCondLst>
+                                  <p:childTnLst>
+                                    <p:set>
+                                      <p:cBhvr>
+                                        <p:cTn id="108" dur="1" fill="hold">
+                                          <p:stCondLst>
+                                            <p:cond delay="0"/>
+                                          </p:stCondLst>
+                                        </p:cTn>
+                                        <p:tgtEl>
+                                          <p:spTgt spid="303"/>
+                                        </p:tgtEl>
+                                        <p:attrNameLst>
+                                          <p:attrName>style.visibility</p:attrName>
+                                        </p:attrNameLst>
+                                      </p:cBhvr>
+                                      <p:to>
+                                        <p:strVal val="visible"/>
+                                      </p:to>
+                                    </p:set>
+                                  </p:childTnLst>
+                                </p:cTn>
+                              </p:par>
+                            </p:childTnLst>
+                          </p:cTn>
+                        </p:par>
+                      </p:childTnLst>
+                    </p:cTn>
+                  </p:par>
+                  <p:par>
+                    <p:cTn id="109" fill="hold">
+                      <p:stCondLst>
+                        <p:cond delay="indefinite"/>
+                      </p:stCondLst>
+                      <p:childTnLst>
+                        <p:par>
+                          <p:cTn id="110" fill="hold">
+                            <p:stCondLst>
+                              <p:cond delay="0"/>
+                            </p:stCondLst>
+                            <p:childTnLst>
+                              <p:par>
+                                <p:cTn id="111" presetID="1" presetClass="entr" presetSubtype="0" fill="hold" nodeType="clickEffect">
+                                  <p:stCondLst>
+                                    <p:cond delay="0"/>
+                                  </p:stCondLst>
+                                  <p:childTnLst>
+                                    <p:set>
+                                      <p:cBhvr>
+                                        <p:cTn id="112" dur="1" fill="hold">
+                                          <p:stCondLst>
+                                            <p:cond delay="0"/>
+                                          </p:stCondLst>
+                                        </p:cTn>
+                                        <p:tgtEl>
+                                          <p:spTgt spid="304"/>
+                                        </p:tgtEl>
+                                        <p:attrNameLst>
+                                          <p:attrName>style.visibility</p:attrName>
+                                        </p:attrNameLst>
+                                      </p:cBhvr>
+                                      <p:to>
+                                        <p:strVal val="visible"/>
+                                      </p:to>
+                                    </p:set>
+                                  </p:childTnLst>
+                                </p:cTn>
+                              </p:par>
+                            </p:childTnLst>
+                          </p:cTn>
+                        </p:par>
+                      </p:childTnLst>
+                    </p:cTn>
+                  </p:par>
+                  <p:par>
+                    <p:cTn id="113" fill="hold">
+                      <p:stCondLst>
+                        <p:cond delay="indefinite"/>
+                      </p:stCondLst>
+                      <p:childTnLst>
+                        <p:par>
+                          <p:cTn id="114" fill="hold">
+                            <p:stCondLst>
+                              <p:cond delay="0"/>
+                            </p:stCondLst>
+                            <p:childTnLst>
+                              <p:par>
+                                <p:cTn id="115" presetID="1" presetClass="entr" presetSubtype="0" fill="hold" nodeType="clickEffect">
+                                  <p:stCondLst>
+                                    <p:cond delay="0"/>
+                                  </p:stCondLst>
+                                  <p:childTnLst>
+                                    <p:set>
+                                      <p:cBhvr>
+                                        <p:cTn id="116" dur="1" fill="hold">
+                                          <p:stCondLst>
+                                            <p:cond delay="0"/>
+                                          </p:stCondLst>
+                                        </p:cTn>
+                                        <p:tgtEl>
+                                          <p:spTgt spid="308"/>
+                                        </p:tgtEl>
+                                        <p:attrNameLst>
+                                          <p:attrName>style.visibility</p:attrName>
+                                        </p:attrNameLst>
+                                      </p:cBhvr>
+                                      <p:to>
+                                        <p:strVal val="visible"/>
+                                      </p:to>
+                                    </p:set>
+                                  </p:childTnLst>
+                                </p:cTn>
+                              </p:par>
+                            </p:childTnLst>
+                          </p:cTn>
+                        </p:par>
+                      </p:childTnLst>
+                    </p:cTn>
+                  </p:par>
+                  <p:par>
+                    <p:cTn id="117" fill="hold">
+                      <p:stCondLst>
+                        <p:cond delay="indefinite"/>
+                      </p:stCondLst>
+                      <p:childTnLst>
+                        <p:par>
+                          <p:cTn id="118" fill="hold">
+                            <p:stCondLst>
+                              <p:cond delay="0"/>
+                            </p:stCondLst>
+                            <p:childTnLst>
+                              <p:par>
+                                <p:cTn id="119" presetID="1" presetClass="entr" presetSubtype="0" fill="hold" grpId="0" nodeType="clickEffect">
+                                  <p:stCondLst>
+                                    <p:cond delay="0"/>
+                                  </p:stCondLst>
+                                  <p:childTnLst>
+                                    <p:set>
+                                      <p:cBhvr>
+                                        <p:cTn id="120" dur="1" fill="hold">
+                                          <p:stCondLst>
+                                            <p:cond delay="0"/>
+                                          </p:stCondLst>
+                                        </p:cTn>
+                                        <p:tgtEl>
+                                          <p:spTgt spid="311"/>
+                                        </p:tgtEl>
+                                        <p:attrNameLst>
+                                          <p:attrName>style.visibility</p:attrName>
+                                        </p:attrNameLst>
+                                      </p:cBhvr>
+                                      <p:to>
+                                        <p:strVal val="visible"/>
+                                      </p:to>
+                                    </p:set>
+                                  </p:childTnLst>
+                                </p:cTn>
+                              </p:par>
+                            </p:childTnLst>
+                          </p:cTn>
+                        </p:par>
+                      </p:childTnLst>
+                    </p:cTn>
+                  </p:par>
+                  <p:par>
+                    <p:cTn id="121" fill="hold">
+                      <p:stCondLst>
+                        <p:cond delay="indefinite"/>
+                      </p:stCondLst>
+                      <p:childTnLst>
+                        <p:par>
+                          <p:cTn id="122" fill="hold">
+                            <p:stCondLst>
+                              <p:cond delay="0"/>
+                            </p:stCondLst>
+                            <p:childTnLst>
+                              <p:par>
+                                <p:cTn id="123" presetID="1" presetClass="entr" presetSubtype="0" fill="hold" grpId="0" nodeType="clickEffect">
+                                  <p:stCondLst>
+                                    <p:cond delay="0"/>
+                                  </p:stCondLst>
+                                  <p:childTnLst>
+                                    <p:set>
+                                      <p:cBhvr>
+                                        <p:cTn id="124" dur="1" fill="hold">
+                                          <p:stCondLst>
+                                            <p:cond delay="0"/>
+                                          </p:stCondLst>
+                                        </p:cTn>
+                                        <p:tgtEl>
+                                          <p:spTgt spid="312"/>
+                                        </p:tgtEl>
+                                        <p:attrNameLst>
+                                          <p:attrName>style.visibility</p:attrName>
+                                        </p:attrNameLst>
+                                      </p:cBhvr>
+                                      <p:to>
+                                        <p:strVal val="visible"/>
+                                      </p:to>
+                                    </p:set>
+                                  </p:childTnLst>
+                                </p:cTn>
+                              </p:par>
+                            </p:childTnLst>
+                          </p:cTn>
+                        </p:par>
+                      </p:childTnLst>
+                    </p:cTn>
+                  </p:par>
+                  <p:par>
+                    <p:cTn id="125" fill="hold">
+                      <p:stCondLst>
+                        <p:cond delay="indefinite"/>
+                      </p:stCondLst>
+                      <p:childTnLst>
+                        <p:par>
+                          <p:cTn id="126" fill="hold">
+                            <p:stCondLst>
+                              <p:cond delay="0"/>
+                            </p:stCondLst>
+                            <p:childTnLst>
+                              <p:par>
+                                <p:cTn id="127" presetID="1" presetClass="entr" presetSubtype="0" fill="hold" nodeType="clickEffect">
+                                  <p:stCondLst>
+                                    <p:cond delay="0"/>
+                                  </p:stCondLst>
+                                  <p:childTnLst>
+                                    <p:set>
+                                      <p:cBhvr>
+                                        <p:cTn id="128" dur="1" fill="hold">
+                                          <p:stCondLst>
+                                            <p:cond delay="0"/>
+                                          </p:stCondLst>
+                                        </p:cTn>
+                                        <p:tgtEl>
+                                          <p:spTgt spid="313"/>
+                                        </p:tgtEl>
+                                        <p:attrNameLst>
+                                          <p:attrName>style.visibility</p:attrName>
+                                        </p:attrNameLst>
+                                      </p:cBhvr>
+                                      <p:to>
+                                        <p:strVal val="visible"/>
+                                      </p:to>
+                                    </p:set>
+                                  </p:childTnLst>
+                                </p:cTn>
+                              </p:par>
+                            </p:childTnLst>
+                          </p:cTn>
+                        </p:par>
+                      </p:childTnLst>
+                    </p:cTn>
+                  </p:par>
+                  <p:par>
+                    <p:cTn id="129" fill="hold">
+                      <p:stCondLst>
+                        <p:cond delay="indefinite"/>
+                      </p:stCondLst>
+                      <p:childTnLst>
+                        <p:par>
+                          <p:cTn id="130" fill="hold">
+                            <p:stCondLst>
+                              <p:cond delay="0"/>
+                            </p:stCondLst>
+                            <p:childTnLst>
+                              <p:par>
+                                <p:cTn id="131" presetID="1" presetClass="entr" presetSubtype="0" fill="hold" nodeType="clickEffect">
+                                  <p:stCondLst>
+                                    <p:cond delay="0"/>
+                                  </p:stCondLst>
+                                  <p:childTnLst>
+                                    <p:set>
+                                      <p:cBhvr>
+                                        <p:cTn id="132" dur="1" fill="hold">
+                                          <p:stCondLst>
+                                            <p:cond delay="0"/>
+                                          </p:stCondLst>
+                                        </p:cTn>
+                                        <p:tgtEl>
+                                          <p:spTgt spid="314"/>
+                                        </p:tgtEl>
+                                        <p:attrNameLst>
+                                          <p:attrName>style.visibility</p:attrName>
+                                        </p:attrNameLst>
+                                      </p:cBhvr>
+                                      <p:to>
+                                        <p:strVal val="visible"/>
+                                      </p:to>
+                                    </p:set>
+                                  </p:childTnLst>
+                                </p:cTn>
+                              </p:par>
+                            </p:childTnLst>
+                          </p:cTn>
+                        </p:par>
+                      </p:childTnLst>
+                    </p:cTn>
+                  </p:par>
+                  <p:par>
+                    <p:cTn id="133" fill="hold">
+                      <p:stCondLst>
+                        <p:cond delay="indefinite"/>
+                      </p:stCondLst>
+                      <p:childTnLst>
+                        <p:par>
+                          <p:cTn id="134" fill="hold">
+                            <p:stCondLst>
+                              <p:cond delay="0"/>
+                            </p:stCondLst>
+                            <p:childTnLst>
+                              <p:par>
+                                <p:cTn id="135" presetID="1" presetClass="entr" presetSubtype="0" fill="hold" nodeType="clickEffect">
+                                  <p:stCondLst>
+                                    <p:cond delay="0"/>
+                                  </p:stCondLst>
+                                  <p:childTnLst>
+                                    <p:set>
+                                      <p:cBhvr>
+                                        <p:cTn id="136" dur="1" fill="hold">
+                                          <p:stCondLst>
+                                            <p:cond delay="0"/>
+                                          </p:stCondLst>
+                                        </p:cTn>
+                                        <p:tgtEl>
+                                          <p:spTgt spid="315"/>
+                                        </p:tgtEl>
+                                        <p:attrNameLst>
+                                          <p:attrName>style.visibility</p:attrName>
+                                        </p:attrNameLst>
+                                      </p:cBhvr>
+                                      <p:to>
+                                        <p:strVal val="visible"/>
+                                      </p:to>
+                                    </p:set>
+                                  </p:childTnLst>
+                                </p:cTn>
+                              </p:par>
+                            </p:childTnLst>
+                          </p:cTn>
+                        </p:par>
+                      </p:childTnLst>
+                    </p:cTn>
+                  </p:par>
+                  <p:par>
+                    <p:cTn id="137" fill="hold">
+                      <p:stCondLst>
+                        <p:cond delay="indefinite"/>
+                      </p:stCondLst>
+                      <p:childTnLst>
+                        <p:par>
+                          <p:cTn id="138" fill="hold">
+                            <p:stCondLst>
+                              <p:cond delay="0"/>
+                            </p:stCondLst>
+                            <p:childTnLst>
+                              <p:par>
+                                <p:cTn id="139" presetID="1" presetClass="entr" presetSubtype="0" fill="hold" grpId="0" nodeType="clickEffect">
+                                  <p:stCondLst>
+                                    <p:cond delay="0"/>
+                                  </p:stCondLst>
+                                  <p:childTnLst>
+                                    <p:set>
+                                      <p:cBhvr>
+                                        <p:cTn id="140" dur="1" fill="hold">
+                                          <p:stCondLst>
+                                            <p:cond delay="0"/>
+                                          </p:stCondLst>
+                                        </p:cTn>
+                                        <p:tgtEl>
+                                          <p:spTgt spid="320"/>
+                                        </p:tgtEl>
+                                        <p:attrNameLst>
+                                          <p:attrName>style.visibility</p:attrName>
+                                        </p:attrNameLst>
+                                      </p:cBhvr>
+                                      <p:to>
+                                        <p:strVal val="visible"/>
+                                      </p:to>
+                                    </p:set>
+                                  </p:childTnLst>
+                                </p:cTn>
+                              </p:par>
+                            </p:childTnLst>
+                          </p:cTn>
+                        </p:par>
+                      </p:childTnLst>
+                    </p:cTn>
+                  </p:par>
+                  <p:par>
+                    <p:cTn id="141" fill="hold">
+                      <p:stCondLst>
+                        <p:cond delay="indefinite"/>
+                      </p:stCondLst>
+                      <p:childTnLst>
+                        <p:par>
+                          <p:cTn id="142" fill="hold">
+                            <p:stCondLst>
+                              <p:cond delay="0"/>
+                            </p:stCondLst>
+                            <p:childTnLst>
+                              <p:par>
+                                <p:cTn id="143" presetID="1" presetClass="entr" presetSubtype="0" fill="hold" grpId="0" nodeType="clickEffect">
+                                  <p:stCondLst>
+                                    <p:cond delay="0"/>
+                                  </p:stCondLst>
+                                  <p:childTnLst>
+                                    <p:set>
+                                      <p:cBhvr>
+                                        <p:cTn id="144" dur="1" fill="hold">
+                                          <p:stCondLst>
+                                            <p:cond delay="0"/>
+                                          </p:stCondLst>
+                                        </p:cTn>
+                                        <p:tgtEl>
+                                          <p:spTgt spid="321"/>
+                                        </p:tgtEl>
+                                        <p:attrNameLst>
+                                          <p:attrName>style.visibility</p:attrName>
+                                        </p:attrNameLst>
+                                      </p:cBhvr>
+                                      <p:to>
+                                        <p:strVal val="visible"/>
+                                      </p:to>
+                                    </p:set>
+                                  </p:childTnLst>
+                                </p:cTn>
+                              </p:par>
+                            </p:childTnLst>
+                          </p:cTn>
+                        </p:par>
+                      </p:childTnLst>
+                    </p:cTn>
+                  </p:par>
+                  <p:par>
+                    <p:cTn id="145" fill="hold">
+                      <p:stCondLst>
+                        <p:cond delay="indefinite"/>
+                      </p:stCondLst>
+                      <p:childTnLst>
+                        <p:par>
+                          <p:cTn id="146" fill="hold">
+                            <p:stCondLst>
+                              <p:cond delay="0"/>
+                            </p:stCondLst>
+                            <p:childTnLst>
+                              <p:par>
+                                <p:cTn id="147" presetID="1" presetClass="entr" presetSubtype="0" fill="hold" grpId="0" nodeType="clickEffect">
+                                  <p:stCondLst>
+                                    <p:cond delay="0"/>
+                                  </p:stCondLst>
+                                  <p:childTnLst>
+                                    <p:set>
+                                      <p:cBhvr>
+                                        <p:cTn id="148" dur="1" fill="hold">
+                                          <p:stCondLst>
+                                            <p:cond delay="0"/>
+                                          </p:stCondLst>
+                                        </p:cTn>
+                                        <p:tgtEl>
+                                          <p:spTgt spid="322"/>
+                                        </p:tgtEl>
+                                        <p:attrNameLst>
+                                          <p:attrName>style.visibility</p:attrName>
+                                        </p:attrNameLst>
+                                      </p:cBhvr>
+                                      <p:to>
+                                        <p:strVal val="visible"/>
+                                      </p:to>
+                                    </p:set>
+                                  </p:childTnLst>
+                                </p:cTn>
+                              </p:par>
+                            </p:childTnLst>
+                          </p:cTn>
+                        </p:par>
+                      </p:childTnLst>
+                    </p:cTn>
+                  </p:par>
+                </p:childTnLst>
+              </p:cTn>
+              <p:prevCondLst>
+                <p:cond evt="onPrev" delay="0">
+                  <p:tgtEl>
+                    <p:sldTgt/>
+                  </p:tgtEl>
+                </p:cond>
+              </p:prevCondLst>
+              <p:nextCondLst>
+                <p:cond evt="onNext" delay="0">
+                  <p:tgtEl>
+                    <p:sldTgt/>
+                  </p:tgtEl>
+                </p:cond>
+              </p:nextCondLst>
+            </p:seq>
+          </p:childTnLst>
+        </p:cTn>
+      </p:par>
+    </p:tnLst>
+    <p:bldLst>
+      <p:bldP spid="69" grpId="0"/>
+      <p:bldP spid="70" grpId="0"/>
+      <p:bldP spid="71" grpId="0"/>
+      <p:bldP spid="72" grpId="0"/>
+      <p:bldP spid="73" grpId="0"/>
+      <p:bldP spid="74" grpId="0"/>
+      <p:bldP spid="195" grpId="0"/>
+      <p:bldP spid="196" grpId="0"/>
+      <p:bldP spid="198" grpId="0"/>
+      <p:bldP spid="199" grpId="0"/>
+      <p:bldP spid="200" grpId="0"/>
+      <p:bldP spid="267" grpId="0"/>
+      <p:bldP spid="271" grpId="0"/>
+      <p:bldP spid="272" grpId="0"/>
+      <p:bldP spid="274" grpId="0"/>
+      <p:bldP spid="303" grpId="0"/>
+      <p:bldP spid="311" grpId="0"/>
+      <p:bldP spid="312" grpId="0"/>
+      <p:bldP spid="320" grpId="0"/>
+      <p:bldP spid="321" grpId="0"/>
+      <p:bldP spid="322" grpId="0"/>
     </p:bldLst>
   </p:timing>
 </p:sld>

</xml_diff>